<commit_message>
corrected punctuation and tested permissions
</commit_message>
<xml_diff>
--- a/02-why_write_tests_why_is_that_hard.pptx
+++ b/02-why_write_tests_why_is_that_hard.pptx
@@ -1714,10 +1714,9 @@
         <a:p>
           <a:pPr algn="ctr"/>
           <a:r>
-            <a:rPr lang="en-US" dirty="0" smtClean="0"/>
+            <a:rPr lang="en-US" dirty="0"/>
             <a:t>make change</a:t>
           </a:r>
-          <a:endParaRPr lang="en-US" dirty="0"/>
         </a:p>
       </dgm:t>
     </dgm:pt>
@@ -1754,10 +1753,9 @@
         <a:p>
           <a:pPr algn="ctr"/>
           <a:r>
-            <a:rPr lang="en-US" dirty="0" smtClean="0"/>
+            <a:rPr lang="en-US" dirty="0"/>
             <a:t>run chef-client</a:t>
           </a:r>
-          <a:endParaRPr lang="en-US" dirty="0"/>
         </a:p>
       </dgm:t>
     </dgm:pt>
@@ -1794,10 +1792,9 @@
         <a:p>
           <a:pPr algn="ctr"/>
           <a:r>
-            <a:rPr lang="en-US" dirty="0" smtClean="0"/>
+            <a:rPr lang="en-US" dirty="0"/>
             <a:t>bootstrap machine</a:t>
           </a:r>
-          <a:endParaRPr lang="en-US" dirty="0"/>
         </a:p>
       </dgm:t>
     </dgm:pt>
@@ -1834,10 +1831,9 @@
         <a:p>
           <a:pPr algn="ctr"/>
           <a:r>
-            <a:rPr lang="en-US" dirty="0" smtClean="0"/>
+            <a:rPr lang="en-US" dirty="0"/>
             <a:t>provision machine</a:t>
           </a:r>
-          <a:endParaRPr lang="en-US" dirty="0"/>
         </a:p>
       </dgm:t>
     </dgm:pt>
@@ -1874,10 +1870,9 @@
         <a:p>
           <a:pPr algn="ctr"/>
           <a:r>
-            <a:rPr lang="en-US" dirty="0" smtClean="0"/>
+            <a:rPr lang="en-US" dirty="0"/>
             <a:t>upload cookbook</a:t>
           </a:r>
-          <a:endParaRPr lang="en-US" dirty="0"/>
         </a:p>
       </dgm:t>
     </dgm:pt>
@@ -1918,11 +1913,11 @@
         <a:p>
           <a:pPr algn="ctr"/>
           <a:r>
-            <a:rPr lang="en-US" dirty="0" smtClean="0"/>
+            <a:rPr lang="en-US" dirty="0"/>
             <a:t>ad hoc</a:t>
           </a:r>
           <a:r>
-            <a:rPr lang="en-US" baseline="0" dirty="0" smtClean="0"/>
+            <a:rPr lang="en-US" baseline="0" dirty="0"/>
             <a:t> verification</a:t>
           </a:r>
           <a:endParaRPr lang="en-US" dirty="0"/>
@@ -1961,13 +1956,6 @@
         </dgm:presLayoutVars>
       </dgm:prSet>
       <dgm:spPr/>
-      <dgm:t>
-        <a:bodyPr/>
-        <a:lstStyle/>
-        <a:p>
-          <a:endParaRPr lang="en-US"/>
-        </a:p>
-      </dgm:t>
     </dgm:pt>
     <dgm:pt modelId="{94E626C9-F87A-E043-A22D-F6B29DD1EF98}" type="pres">
       <dgm:prSet presAssocID="{3F36FED0-EF5E-1A42-98BA-F725FCC46927}" presName="node" presStyleLbl="node1" presStyleIdx="0" presStyleCnt="6">
@@ -1976,35 +1964,14 @@
         </dgm:presLayoutVars>
       </dgm:prSet>
       <dgm:spPr/>
-      <dgm:t>
-        <a:bodyPr/>
-        <a:lstStyle/>
-        <a:p>
-          <a:endParaRPr lang="en-US"/>
-        </a:p>
-      </dgm:t>
     </dgm:pt>
     <dgm:pt modelId="{0FC4F28F-3C3C-8D46-A2CB-819F5E0BA797}" type="pres">
       <dgm:prSet presAssocID="{1BDAC051-1D86-9649-9776-B82766636A19}" presName="sibTrans" presStyleLbl="sibTrans2D1" presStyleIdx="0" presStyleCnt="6"/>
       <dgm:spPr/>
-      <dgm:t>
-        <a:bodyPr/>
-        <a:lstStyle/>
-        <a:p>
-          <a:endParaRPr lang="en-US"/>
-        </a:p>
-      </dgm:t>
     </dgm:pt>
     <dgm:pt modelId="{05D3C2B6-C474-AA4C-80D9-CA9A6F3D9CE6}" type="pres">
       <dgm:prSet presAssocID="{1BDAC051-1D86-9649-9776-B82766636A19}" presName="connectorText" presStyleLbl="sibTrans2D1" presStyleIdx="0" presStyleCnt="6"/>
       <dgm:spPr/>
-      <dgm:t>
-        <a:bodyPr/>
-        <a:lstStyle/>
-        <a:p>
-          <a:endParaRPr lang="en-US"/>
-        </a:p>
-      </dgm:t>
     </dgm:pt>
     <dgm:pt modelId="{135C90DA-3EC2-A54F-866A-BB18EEF25E45}" type="pres">
       <dgm:prSet presAssocID="{56B83FC8-630A-654C-967A-D3A8D923ADAA}" presName="node" presStyleLbl="node1" presStyleIdx="1" presStyleCnt="6">
@@ -2013,35 +1980,14 @@
         </dgm:presLayoutVars>
       </dgm:prSet>
       <dgm:spPr/>
-      <dgm:t>
-        <a:bodyPr/>
-        <a:lstStyle/>
-        <a:p>
-          <a:endParaRPr lang="en-US"/>
-        </a:p>
-      </dgm:t>
     </dgm:pt>
     <dgm:pt modelId="{069690A2-A8DE-8D4D-9E05-D20B4AD80AD5}" type="pres">
       <dgm:prSet presAssocID="{0D7C27DE-7D4D-A847-9D73-17717295B629}" presName="sibTrans" presStyleLbl="sibTrans2D1" presStyleIdx="1" presStyleCnt="6"/>
       <dgm:spPr/>
-      <dgm:t>
-        <a:bodyPr/>
-        <a:lstStyle/>
-        <a:p>
-          <a:endParaRPr lang="en-US"/>
-        </a:p>
-      </dgm:t>
     </dgm:pt>
     <dgm:pt modelId="{820F0926-7D71-014F-B7B6-834D588F001B}" type="pres">
       <dgm:prSet presAssocID="{0D7C27DE-7D4D-A847-9D73-17717295B629}" presName="connectorText" presStyleLbl="sibTrans2D1" presStyleIdx="1" presStyleCnt="6"/>
       <dgm:spPr/>
-      <dgm:t>
-        <a:bodyPr/>
-        <a:lstStyle/>
-        <a:p>
-          <a:endParaRPr lang="en-US"/>
-        </a:p>
-      </dgm:t>
     </dgm:pt>
     <dgm:pt modelId="{355913FF-97CF-6343-854B-F45A3E4AD525}" type="pres">
       <dgm:prSet presAssocID="{991DCA35-E91D-B649-B58B-8104F1A6AECB}" presName="node" presStyleLbl="node1" presStyleIdx="2" presStyleCnt="6">
@@ -2050,35 +1996,14 @@
         </dgm:presLayoutVars>
       </dgm:prSet>
       <dgm:spPr/>
-      <dgm:t>
-        <a:bodyPr/>
-        <a:lstStyle/>
-        <a:p>
-          <a:endParaRPr lang="en-US"/>
-        </a:p>
-      </dgm:t>
     </dgm:pt>
     <dgm:pt modelId="{C45BB854-D005-BB4E-B171-E5A2DA33D7C6}" type="pres">
       <dgm:prSet presAssocID="{DB7055CB-533B-5948-A8A4-913ED397A03C}" presName="sibTrans" presStyleLbl="sibTrans2D1" presStyleIdx="2" presStyleCnt="6"/>
       <dgm:spPr/>
-      <dgm:t>
-        <a:bodyPr/>
-        <a:lstStyle/>
-        <a:p>
-          <a:endParaRPr lang="en-US"/>
-        </a:p>
-      </dgm:t>
     </dgm:pt>
     <dgm:pt modelId="{075EDDB9-0C96-2B43-A392-A0ECBF74C743}" type="pres">
       <dgm:prSet presAssocID="{DB7055CB-533B-5948-A8A4-913ED397A03C}" presName="connectorText" presStyleLbl="sibTrans2D1" presStyleIdx="2" presStyleCnt="6"/>
       <dgm:spPr/>
-      <dgm:t>
-        <a:bodyPr/>
-        <a:lstStyle/>
-        <a:p>
-          <a:endParaRPr lang="en-US"/>
-        </a:p>
-      </dgm:t>
     </dgm:pt>
     <dgm:pt modelId="{277BD6EF-3286-4548-ACB0-5BD048391FD5}" type="pres">
       <dgm:prSet presAssocID="{52016F2E-FC5B-4C4F-8DB8-7A4532486296}" presName="node" presStyleLbl="node1" presStyleIdx="3" presStyleCnt="6">
@@ -2087,35 +2012,14 @@
         </dgm:presLayoutVars>
       </dgm:prSet>
       <dgm:spPr/>
-      <dgm:t>
-        <a:bodyPr/>
-        <a:lstStyle/>
-        <a:p>
-          <a:endParaRPr lang="en-US"/>
-        </a:p>
-      </dgm:t>
     </dgm:pt>
     <dgm:pt modelId="{4BD5D680-E82F-D842-9581-4C08B85C229F}" type="pres">
       <dgm:prSet presAssocID="{54530FEA-48EB-A341-BC9F-3A8FF18CC516}" presName="sibTrans" presStyleLbl="sibTrans2D1" presStyleIdx="3" presStyleCnt="6"/>
       <dgm:spPr/>
-      <dgm:t>
-        <a:bodyPr/>
-        <a:lstStyle/>
-        <a:p>
-          <a:endParaRPr lang="en-US"/>
-        </a:p>
-      </dgm:t>
     </dgm:pt>
     <dgm:pt modelId="{46692498-78BE-4D48-A59A-4B892CAE6AC6}" type="pres">
       <dgm:prSet presAssocID="{54530FEA-48EB-A341-BC9F-3A8FF18CC516}" presName="connectorText" presStyleLbl="sibTrans2D1" presStyleIdx="3" presStyleCnt="6"/>
       <dgm:spPr/>
-      <dgm:t>
-        <a:bodyPr/>
-        <a:lstStyle/>
-        <a:p>
-          <a:endParaRPr lang="en-US"/>
-        </a:p>
-      </dgm:t>
     </dgm:pt>
     <dgm:pt modelId="{4C2C4433-38AC-2D40-992F-92C864C62041}" type="pres">
       <dgm:prSet presAssocID="{3FA566BD-5967-2544-BD1D-F073F6C40B58}" presName="node" presStyleLbl="node1" presStyleIdx="4" presStyleCnt="6">
@@ -2124,35 +2028,14 @@
         </dgm:presLayoutVars>
       </dgm:prSet>
       <dgm:spPr/>
-      <dgm:t>
-        <a:bodyPr/>
-        <a:lstStyle/>
-        <a:p>
-          <a:endParaRPr lang="en-US"/>
-        </a:p>
-      </dgm:t>
     </dgm:pt>
     <dgm:pt modelId="{33FBB568-E1BF-1D48-8976-37B629C706B2}" type="pres">
       <dgm:prSet presAssocID="{66446A9F-23D4-494C-8D15-010680B0DE03}" presName="sibTrans" presStyleLbl="sibTrans2D1" presStyleIdx="4" presStyleCnt="6"/>
       <dgm:spPr/>
-      <dgm:t>
-        <a:bodyPr/>
-        <a:lstStyle/>
-        <a:p>
-          <a:endParaRPr lang="en-US"/>
-        </a:p>
-      </dgm:t>
     </dgm:pt>
     <dgm:pt modelId="{4F5F3730-54DE-084B-91AE-9EC8B5553FA5}" type="pres">
       <dgm:prSet presAssocID="{66446A9F-23D4-494C-8D15-010680B0DE03}" presName="connectorText" presStyleLbl="sibTrans2D1" presStyleIdx="4" presStyleCnt="6"/>
       <dgm:spPr/>
-      <dgm:t>
-        <a:bodyPr/>
-        <a:lstStyle/>
-        <a:p>
-          <a:endParaRPr lang="en-US"/>
-        </a:p>
-      </dgm:t>
     </dgm:pt>
     <dgm:pt modelId="{C80D0CE8-CCC4-254A-ADE6-18CC87CC4ACE}" type="pres">
       <dgm:prSet presAssocID="{CDB4AFFD-35E7-264B-9BBD-A621B18FE722}" presName="node" presStyleLbl="node1" presStyleIdx="5" presStyleCnt="6">
@@ -2161,63 +2044,42 @@
         </dgm:presLayoutVars>
       </dgm:prSet>
       <dgm:spPr/>
-      <dgm:t>
-        <a:bodyPr/>
-        <a:lstStyle/>
-        <a:p>
-          <a:endParaRPr lang="en-US"/>
-        </a:p>
-      </dgm:t>
     </dgm:pt>
     <dgm:pt modelId="{587BAFEE-4925-584C-98DC-D956EB2383A2}" type="pres">
       <dgm:prSet presAssocID="{023F43F1-4240-0640-B914-4E7AE7038AFC}" presName="sibTrans" presStyleLbl="sibTrans2D1" presStyleIdx="5" presStyleCnt="6"/>
       <dgm:spPr/>
-      <dgm:t>
-        <a:bodyPr/>
-        <a:lstStyle/>
-        <a:p>
-          <a:endParaRPr lang="en-US"/>
-        </a:p>
-      </dgm:t>
     </dgm:pt>
     <dgm:pt modelId="{F31AD22F-6A84-7A40-91FB-F8520167703B}" type="pres">
       <dgm:prSet presAssocID="{023F43F1-4240-0640-B914-4E7AE7038AFC}" presName="connectorText" presStyleLbl="sibTrans2D1" presStyleIdx="5" presStyleCnt="6"/>
       <dgm:spPr/>
-      <dgm:t>
-        <a:bodyPr/>
-        <a:lstStyle/>
-        <a:p>
-          <a:endParaRPr lang="en-US"/>
-        </a:p>
-      </dgm:t>
     </dgm:pt>
   </dgm:ptLst>
   <dgm:cxnLst>
-    <dgm:cxn modelId="{4F6A554F-F593-E546-805F-2FA25142AAF4}" srcId="{C236C83C-B288-304E-94BF-E61CD5B8E514}" destId="{CDB4AFFD-35E7-264B-9BBD-A621B18FE722}" srcOrd="5" destOrd="0" parTransId="{D0257083-3B53-434C-B1FA-801D9BC35039}" sibTransId="{023F43F1-4240-0640-B914-4E7AE7038AFC}"/>
-    <dgm:cxn modelId="{346C8BE2-B944-8143-B6A0-D8325F348E83}" srcId="{C236C83C-B288-304E-94BF-E61CD5B8E514}" destId="{991DCA35-E91D-B649-B58B-8104F1A6AECB}" srcOrd="2" destOrd="0" parTransId="{A815B055-67D2-3345-B1C1-93D3B54A99D3}" sibTransId="{DB7055CB-533B-5948-A8A4-913ED397A03C}"/>
+    <dgm:cxn modelId="{14BEBA19-DF70-144F-BD18-6EB5449923C4}" type="presOf" srcId="{3FA566BD-5967-2544-BD1D-F073F6C40B58}" destId="{4C2C4433-38AC-2D40-992F-92C864C62041}" srcOrd="0" destOrd="0" presId="urn:microsoft.com/office/officeart/2005/8/layout/cycle2"/>
+    <dgm:cxn modelId="{35988321-A73B-644D-A357-4859723CA3FE}" type="presOf" srcId="{54530FEA-48EB-A341-BC9F-3A8FF18CC516}" destId="{46692498-78BE-4D48-A59A-4B892CAE6AC6}" srcOrd="1" destOrd="0" presId="urn:microsoft.com/office/officeart/2005/8/layout/cycle2"/>
+    <dgm:cxn modelId="{DCABB525-D7FE-6744-BC76-D58344FA1D9E}" srcId="{C236C83C-B288-304E-94BF-E61CD5B8E514}" destId="{56B83FC8-630A-654C-967A-D3A8D923ADAA}" srcOrd="1" destOrd="0" parTransId="{26BF0F39-2F2B-5B4C-92A9-FDADBA7D936C}" sibTransId="{0D7C27DE-7D4D-A847-9D73-17717295B629}"/>
     <dgm:cxn modelId="{793CBE28-0778-6C45-8C06-620663D74B2F}" type="presOf" srcId="{991DCA35-E91D-B649-B58B-8104F1A6AECB}" destId="{355913FF-97CF-6343-854B-F45A3E4AD525}" srcOrd="0" destOrd="0" presId="urn:microsoft.com/office/officeart/2005/8/layout/cycle2"/>
-    <dgm:cxn modelId="{83275EBE-E565-D14F-8BDE-B6A259E53DEF}" type="presOf" srcId="{1BDAC051-1D86-9649-9776-B82766636A19}" destId="{05D3C2B6-C474-AA4C-80D9-CA9A6F3D9CE6}" srcOrd="1" destOrd="0" presId="urn:microsoft.com/office/officeart/2005/8/layout/cycle2"/>
-    <dgm:cxn modelId="{10DA5E93-63D6-5C41-91C1-C66757B3B73E}" type="presOf" srcId="{0D7C27DE-7D4D-A847-9D73-17717295B629}" destId="{820F0926-7D71-014F-B7B6-834D588F001B}" srcOrd="1" destOrd="0" presId="urn:microsoft.com/office/officeart/2005/8/layout/cycle2"/>
-    <dgm:cxn modelId="{2E295BBB-B1EF-8A47-9617-FED067CFF55A}" srcId="{C236C83C-B288-304E-94BF-E61CD5B8E514}" destId="{52016F2E-FC5B-4C4F-8DB8-7A4532486296}" srcOrd="3" destOrd="0" parTransId="{1E960FEB-E50A-A745-BF50-03470881EAA3}" sibTransId="{54530FEA-48EB-A341-BC9F-3A8FF18CC516}"/>
-    <dgm:cxn modelId="{59020AB6-FAED-8F4E-89F4-E3858D7A8820}" srcId="{C236C83C-B288-304E-94BF-E61CD5B8E514}" destId="{3F36FED0-EF5E-1A42-98BA-F725FCC46927}" srcOrd="0" destOrd="0" parTransId="{BBC748EC-79B0-9343-9059-53D2B5251A9F}" sibTransId="{1BDAC051-1D86-9649-9776-B82766636A19}"/>
-    <dgm:cxn modelId="{DCABB525-D7FE-6744-BC76-D58344FA1D9E}" srcId="{C236C83C-B288-304E-94BF-E61CD5B8E514}" destId="{56B83FC8-630A-654C-967A-D3A8D923ADAA}" srcOrd="1" destOrd="0" parTransId="{26BF0F39-2F2B-5B4C-92A9-FDADBA7D936C}" sibTransId="{0D7C27DE-7D4D-A847-9D73-17717295B629}"/>
-    <dgm:cxn modelId="{48DDB7CD-E00A-3F40-9E5B-08C8B21ECF2C}" type="presOf" srcId="{023F43F1-4240-0640-B914-4E7AE7038AFC}" destId="{F31AD22F-6A84-7A40-91FB-F8520167703B}" srcOrd="1" destOrd="0" presId="urn:microsoft.com/office/officeart/2005/8/layout/cycle2"/>
-    <dgm:cxn modelId="{106143C2-EFEE-6845-9A5F-33911C42DDA2}" type="presOf" srcId="{3F36FED0-EF5E-1A42-98BA-F725FCC46927}" destId="{94E626C9-F87A-E043-A22D-F6B29DD1EF98}" srcOrd="0" destOrd="0" presId="urn:microsoft.com/office/officeart/2005/8/layout/cycle2"/>
     <dgm:cxn modelId="{5B142435-B432-694B-AA2C-A69D34DA6D32}" type="presOf" srcId="{66446A9F-23D4-494C-8D15-010680B0DE03}" destId="{4F5F3730-54DE-084B-91AE-9EC8B5553FA5}" srcOrd="1" destOrd="0" presId="urn:microsoft.com/office/officeart/2005/8/layout/cycle2"/>
-    <dgm:cxn modelId="{5A6D79F9-A0CC-484D-80A7-6358B22A7266}" type="presOf" srcId="{56B83FC8-630A-654C-967A-D3A8D923ADAA}" destId="{135C90DA-3EC2-A54F-866A-BB18EEF25E45}" srcOrd="0" destOrd="0" presId="urn:microsoft.com/office/officeart/2005/8/layout/cycle2"/>
-    <dgm:cxn modelId="{F8244DAA-E360-0445-B80F-3FF814C70A7C}" type="presOf" srcId="{DB7055CB-533B-5948-A8A4-913ED397A03C}" destId="{C45BB854-D005-BB4E-B171-E5A2DA33D7C6}" srcOrd="0" destOrd="0" presId="urn:microsoft.com/office/officeart/2005/8/layout/cycle2"/>
+    <dgm:cxn modelId="{16CD353B-035F-3247-BD46-F9B340884CF8}" type="presOf" srcId="{66446A9F-23D4-494C-8D15-010680B0DE03}" destId="{33FBB568-E1BF-1D48-8976-37B629C706B2}" srcOrd="0" destOrd="0" presId="urn:microsoft.com/office/officeart/2005/8/layout/cycle2"/>
     <dgm:cxn modelId="{D1B3A340-1249-B742-9595-DC49DC34916E}" type="presOf" srcId="{C236C83C-B288-304E-94BF-E61CD5B8E514}" destId="{EDEB5E0A-30F0-A54A-B0F8-F331AEF54BDD}" srcOrd="0" destOrd="0" presId="urn:microsoft.com/office/officeart/2005/8/layout/cycle2"/>
     <dgm:cxn modelId="{2AF6D94A-95FC-D043-B4C5-2C4D21B14C79}" type="presOf" srcId="{023F43F1-4240-0640-B914-4E7AE7038AFC}" destId="{587BAFEE-4925-584C-98DC-D956EB2383A2}" srcOrd="0" destOrd="0" presId="urn:microsoft.com/office/officeart/2005/8/layout/cycle2"/>
+    <dgm:cxn modelId="{4F6A554F-F593-E546-805F-2FA25142AAF4}" srcId="{C236C83C-B288-304E-94BF-E61CD5B8E514}" destId="{CDB4AFFD-35E7-264B-9BBD-A621B18FE722}" srcOrd="5" destOrd="0" parTransId="{D0257083-3B53-434C-B1FA-801D9BC35039}" sibTransId="{023F43F1-4240-0640-B914-4E7AE7038AFC}"/>
+    <dgm:cxn modelId="{80D88852-F733-994E-B785-2C0376F6AA02}" type="presOf" srcId="{DB7055CB-533B-5948-A8A4-913ED397A03C}" destId="{075EDDB9-0C96-2B43-A392-A0ECBF74C743}" srcOrd="1" destOrd="0" presId="urn:microsoft.com/office/officeart/2005/8/layout/cycle2"/>
+    <dgm:cxn modelId="{D0B7E156-3709-1E44-9C4D-1BB353B3DC57}" type="presOf" srcId="{0D7C27DE-7D4D-A847-9D73-17717295B629}" destId="{069690A2-A8DE-8D4D-9E05-D20B4AD80AD5}" srcOrd="0" destOrd="0" presId="urn:microsoft.com/office/officeart/2005/8/layout/cycle2"/>
+    <dgm:cxn modelId="{DB4EEE91-33C0-4B4C-AA78-D602EE53B965}" type="presOf" srcId="{1BDAC051-1D86-9649-9776-B82766636A19}" destId="{0FC4F28F-3C3C-8D46-A2CB-819F5E0BA797}" srcOrd="0" destOrd="0" presId="urn:microsoft.com/office/officeart/2005/8/layout/cycle2"/>
+    <dgm:cxn modelId="{10DA5E93-63D6-5C41-91C1-C66757B3B73E}" type="presOf" srcId="{0D7C27DE-7D4D-A847-9D73-17717295B629}" destId="{820F0926-7D71-014F-B7B6-834D588F001B}" srcOrd="1" destOrd="0" presId="urn:microsoft.com/office/officeart/2005/8/layout/cycle2"/>
+    <dgm:cxn modelId="{F8244DAA-E360-0445-B80F-3FF814C70A7C}" type="presOf" srcId="{DB7055CB-533B-5948-A8A4-913ED397A03C}" destId="{C45BB854-D005-BB4E-B171-E5A2DA33D7C6}" srcOrd="0" destOrd="0" presId="urn:microsoft.com/office/officeart/2005/8/layout/cycle2"/>
     <dgm:cxn modelId="{BA57EAB3-9EE6-4646-AEB2-F422F12E480D}" type="presOf" srcId="{52016F2E-FC5B-4C4F-8DB8-7A4532486296}" destId="{277BD6EF-3286-4548-ACB0-5BD048391FD5}" srcOrd="0" destOrd="0" presId="urn:microsoft.com/office/officeart/2005/8/layout/cycle2"/>
-    <dgm:cxn modelId="{DB4EEE91-33C0-4B4C-AA78-D602EE53B965}" type="presOf" srcId="{1BDAC051-1D86-9649-9776-B82766636A19}" destId="{0FC4F28F-3C3C-8D46-A2CB-819F5E0BA797}" srcOrd="0" destOrd="0" presId="urn:microsoft.com/office/officeart/2005/8/layout/cycle2"/>
-    <dgm:cxn modelId="{D0B7E156-3709-1E44-9C4D-1BB353B3DC57}" type="presOf" srcId="{0D7C27DE-7D4D-A847-9D73-17717295B629}" destId="{069690A2-A8DE-8D4D-9E05-D20B4AD80AD5}" srcOrd="0" destOrd="0" presId="urn:microsoft.com/office/officeart/2005/8/layout/cycle2"/>
-    <dgm:cxn modelId="{80D88852-F733-994E-B785-2C0376F6AA02}" type="presOf" srcId="{DB7055CB-533B-5948-A8A4-913ED397A03C}" destId="{075EDDB9-0C96-2B43-A392-A0ECBF74C743}" srcOrd="1" destOrd="0" presId="urn:microsoft.com/office/officeart/2005/8/layout/cycle2"/>
-    <dgm:cxn modelId="{14BEBA19-DF70-144F-BD18-6EB5449923C4}" type="presOf" srcId="{3FA566BD-5967-2544-BD1D-F073F6C40B58}" destId="{4C2C4433-38AC-2D40-992F-92C864C62041}" srcOrd="0" destOrd="0" presId="urn:microsoft.com/office/officeart/2005/8/layout/cycle2"/>
-    <dgm:cxn modelId="{16CD353B-035F-3247-BD46-F9B340884CF8}" type="presOf" srcId="{66446A9F-23D4-494C-8D15-010680B0DE03}" destId="{33FBB568-E1BF-1D48-8976-37B629C706B2}" srcOrd="0" destOrd="0" presId="urn:microsoft.com/office/officeart/2005/8/layout/cycle2"/>
+    <dgm:cxn modelId="{59020AB6-FAED-8F4E-89F4-E3858D7A8820}" srcId="{C236C83C-B288-304E-94BF-E61CD5B8E514}" destId="{3F36FED0-EF5E-1A42-98BA-F725FCC46927}" srcOrd="0" destOrd="0" parTransId="{BBC748EC-79B0-9343-9059-53D2B5251A9F}" sibTransId="{1BDAC051-1D86-9649-9776-B82766636A19}"/>
+    <dgm:cxn modelId="{2E295BBB-B1EF-8A47-9617-FED067CFF55A}" srcId="{C236C83C-B288-304E-94BF-E61CD5B8E514}" destId="{52016F2E-FC5B-4C4F-8DB8-7A4532486296}" srcOrd="3" destOrd="0" parTransId="{1E960FEB-E50A-A745-BF50-03470881EAA3}" sibTransId="{54530FEA-48EB-A341-BC9F-3A8FF18CC516}"/>
+    <dgm:cxn modelId="{83275EBE-E565-D14F-8BDE-B6A259E53DEF}" type="presOf" srcId="{1BDAC051-1D86-9649-9776-B82766636A19}" destId="{05D3C2B6-C474-AA4C-80D9-CA9A6F3D9CE6}" srcOrd="1" destOrd="0" presId="urn:microsoft.com/office/officeart/2005/8/layout/cycle2"/>
+    <dgm:cxn modelId="{106143C2-EFEE-6845-9A5F-33911C42DDA2}" type="presOf" srcId="{3F36FED0-EF5E-1A42-98BA-F725FCC46927}" destId="{94E626C9-F87A-E043-A22D-F6B29DD1EF98}" srcOrd="0" destOrd="0" presId="urn:microsoft.com/office/officeart/2005/8/layout/cycle2"/>
+    <dgm:cxn modelId="{48DDB7CD-E00A-3F40-9E5B-08C8B21ECF2C}" type="presOf" srcId="{023F43F1-4240-0640-B914-4E7AE7038AFC}" destId="{F31AD22F-6A84-7A40-91FB-F8520167703B}" srcOrd="1" destOrd="0" presId="urn:microsoft.com/office/officeart/2005/8/layout/cycle2"/>
+    <dgm:cxn modelId="{28442EE0-4B07-9744-AFB0-5C5CC223202A}" srcId="{C236C83C-B288-304E-94BF-E61CD5B8E514}" destId="{3FA566BD-5967-2544-BD1D-F073F6C40B58}" srcOrd="4" destOrd="0" parTransId="{00D0E1B9-7C3D-A74C-955C-B94304F4B352}" sibTransId="{66446A9F-23D4-494C-8D15-010680B0DE03}"/>
+    <dgm:cxn modelId="{346C8BE2-B944-8143-B6A0-D8325F348E83}" srcId="{C236C83C-B288-304E-94BF-E61CD5B8E514}" destId="{991DCA35-E91D-B649-B58B-8104F1A6AECB}" srcOrd="2" destOrd="0" parTransId="{A815B055-67D2-3345-B1C1-93D3B54A99D3}" sibTransId="{DB7055CB-533B-5948-A8A4-913ED397A03C}"/>
     <dgm:cxn modelId="{82F457EA-6BA1-0E48-95AE-EF9D709DD2DB}" type="presOf" srcId="{CDB4AFFD-35E7-264B-9BBD-A621B18FE722}" destId="{C80D0CE8-CCC4-254A-ADE6-18CC87CC4ACE}" srcOrd="0" destOrd="0" presId="urn:microsoft.com/office/officeart/2005/8/layout/cycle2"/>
     <dgm:cxn modelId="{8996B1F5-ED7B-734F-866A-21C2093BF73C}" type="presOf" srcId="{54530FEA-48EB-A341-BC9F-3A8FF18CC516}" destId="{4BD5D680-E82F-D842-9581-4C08B85C229F}" srcOrd="0" destOrd="0" presId="urn:microsoft.com/office/officeart/2005/8/layout/cycle2"/>
-    <dgm:cxn modelId="{28442EE0-4B07-9744-AFB0-5C5CC223202A}" srcId="{C236C83C-B288-304E-94BF-E61CD5B8E514}" destId="{3FA566BD-5967-2544-BD1D-F073F6C40B58}" srcOrd="4" destOrd="0" parTransId="{00D0E1B9-7C3D-A74C-955C-B94304F4B352}" sibTransId="{66446A9F-23D4-494C-8D15-010680B0DE03}"/>
-    <dgm:cxn modelId="{35988321-A73B-644D-A357-4859723CA3FE}" type="presOf" srcId="{54530FEA-48EB-A341-BC9F-3A8FF18CC516}" destId="{46692498-78BE-4D48-A59A-4B892CAE6AC6}" srcOrd="1" destOrd="0" presId="urn:microsoft.com/office/officeart/2005/8/layout/cycle2"/>
+    <dgm:cxn modelId="{5A6D79F9-A0CC-484D-80A7-6358B22A7266}" type="presOf" srcId="{56B83FC8-630A-654C-967A-D3A8D923ADAA}" destId="{135C90DA-3EC2-A54F-866A-BB18EEF25E45}" srcOrd="0" destOrd="0" presId="urn:microsoft.com/office/officeart/2005/8/layout/cycle2"/>
     <dgm:cxn modelId="{7404AF6B-C7E0-F749-B1E3-0A4D54FE4731}" type="presParOf" srcId="{EDEB5E0A-30F0-A54A-B0F8-F331AEF54BDD}" destId="{94E626C9-F87A-E043-A22D-F6B29DD1EF98}" srcOrd="0" destOrd="0" presId="urn:microsoft.com/office/officeart/2005/8/layout/cycle2"/>
     <dgm:cxn modelId="{1ECF2648-E6FF-A34E-9A15-69FC8B122B08}" type="presParOf" srcId="{EDEB5E0A-30F0-A54A-B0F8-F331AEF54BDD}" destId="{0FC4F28F-3C3C-8D46-A2CB-819F5E0BA797}" srcOrd="1" destOrd="0" presId="urn:microsoft.com/office/officeart/2005/8/layout/cycle2"/>
     <dgm:cxn modelId="{637261C1-EFB6-6244-BD4B-10075D78CD90}" type="presParOf" srcId="{0FC4F28F-3C3C-8D46-A2CB-819F5E0BA797}" destId="{05D3C2B6-C474-AA4C-80D9-CA9A6F3D9CE6}" srcOrd="0" destOrd="0" presId="urn:microsoft.com/office/officeart/2005/8/layout/cycle2"/>
@@ -2297,10 +2159,9 @@
         <a:p>
           <a:pPr algn="ctr"/>
           <a:r>
-            <a:rPr lang="en-US" dirty="0" smtClean="0"/>
+            <a:rPr lang="en-US" dirty="0"/>
             <a:t>make change</a:t>
           </a:r>
-          <a:endParaRPr lang="en-US" dirty="0"/>
         </a:p>
       </dgm:t>
     </dgm:pt>
@@ -2337,10 +2198,9 @@
         <a:p>
           <a:pPr algn="ctr"/>
           <a:r>
-            <a:rPr lang="en-US" dirty="0" smtClean="0"/>
+            <a:rPr lang="en-US" dirty="0"/>
             <a:t>run testing tools</a:t>
           </a:r>
-          <a:endParaRPr lang="en-US" dirty="0"/>
         </a:p>
       </dgm:t>
     </dgm:pt>
@@ -2381,11 +2241,11 @@
         <a:p>
           <a:pPr algn="ctr"/>
           <a:r>
-            <a:rPr lang="en-US" dirty="0" smtClean="0"/>
+            <a:rPr lang="en-US" dirty="0"/>
             <a:t>automated</a:t>
           </a:r>
           <a:r>
-            <a:rPr lang="en-US" baseline="0" dirty="0" smtClean="0"/>
+            <a:rPr lang="en-US" baseline="0" dirty="0"/>
             <a:t> verification</a:t>
           </a:r>
           <a:endParaRPr lang="en-US" dirty="0"/>
@@ -2424,13 +2284,6 @@
         </dgm:presLayoutVars>
       </dgm:prSet>
       <dgm:spPr/>
-      <dgm:t>
-        <a:bodyPr/>
-        <a:lstStyle/>
-        <a:p>
-          <a:endParaRPr lang="en-US"/>
-        </a:p>
-      </dgm:t>
     </dgm:pt>
     <dgm:pt modelId="{94E626C9-F87A-E043-A22D-F6B29DD1EF98}" type="pres">
       <dgm:prSet presAssocID="{3F36FED0-EF5E-1A42-98BA-F725FCC46927}" presName="node" presStyleLbl="node1" presStyleIdx="0" presStyleCnt="3">
@@ -2439,35 +2292,14 @@
         </dgm:presLayoutVars>
       </dgm:prSet>
       <dgm:spPr/>
-      <dgm:t>
-        <a:bodyPr/>
-        <a:lstStyle/>
-        <a:p>
-          <a:endParaRPr lang="en-US"/>
-        </a:p>
-      </dgm:t>
     </dgm:pt>
     <dgm:pt modelId="{0FC4F28F-3C3C-8D46-A2CB-819F5E0BA797}" type="pres">
       <dgm:prSet presAssocID="{1BDAC051-1D86-9649-9776-B82766636A19}" presName="sibTrans" presStyleLbl="sibTrans2D1" presStyleIdx="0" presStyleCnt="3"/>
       <dgm:spPr/>
-      <dgm:t>
-        <a:bodyPr/>
-        <a:lstStyle/>
-        <a:p>
-          <a:endParaRPr lang="en-US"/>
-        </a:p>
-      </dgm:t>
     </dgm:pt>
     <dgm:pt modelId="{05D3C2B6-C474-AA4C-80D9-CA9A6F3D9CE6}" type="pres">
       <dgm:prSet presAssocID="{1BDAC051-1D86-9649-9776-B82766636A19}" presName="connectorText" presStyleLbl="sibTrans2D1" presStyleIdx="0" presStyleCnt="3"/>
       <dgm:spPr/>
-      <dgm:t>
-        <a:bodyPr/>
-        <a:lstStyle/>
-        <a:p>
-          <a:endParaRPr lang="en-US"/>
-        </a:p>
-      </dgm:t>
     </dgm:pt>
     <dgm:pt modelId="{135C90DA-3EC2-A54F-866A-BB18EEF25E45}" type="pres">
       <dgm:prSet presAssocID="{56B83FC8-630A-654C-967A-D3A8D923ADAA}" presName="node" presStyleLbl="node1" presStyleIdx="1" presStyleCnt="3">
@@ -2476,35 +2308,14 @@
         </dgm:presLayoutVars>
       </dgm:prSet>
       <dgm:spPr/>
-      <dgm:t>
-        <a:bodyPr/>
-        <a:lstStyle/>
-        <a:p>
-          <a:endParaRPr lang="en-US"/>
-        </a:p>
-      </dgm:t>
     </dgm:pt>
     <dgm:pt modelId="{069690A2-A8DE-8D4D-9E05-D20B4AD80AD5}" type="pres">
       <dgm:prSet presAssocID="{0D7C27DE-7D4D-A847-9D73-17717295B629}" presName="sibTrans" presStyleLbl="sibTrans2D1" presStyleIdx="1" presStyleCnt="3"/>
       <dgm:spPr/>
-      <dgm:t>
-        <a:bodyPr/>
-        <a:lstStyle/>
-        <a:p>
-          <a:endParaRPr lang="en-US"/>
-        </a:p>
-      </dgm:t>
     </dgm:pt>
     <dgm:pt modelId="{820F0926-7D71-014F-B7B6-834D588F001B}" type="pres">
       <dgm:prSet presAssocID="{0D7C27DE-7D4D-A847-9D73-17717295B629}" presName="connectorText" presStyleLbl="sibTrans2D1" presStyleIdx="1" presStyleCnt="3"/>
       <dgm:spPr/>
-      <dgm:t>
-        <a:bodyPr/>
-        <a:lstStyle/>
-        <a:p>
-          <a:endParaRPr lang="en-US"/>
-        </a:p>
-      </dgm:t>
     </dgm:pt>
     <dgm:pt modelId="{C80D0CE8-CCC4-254A-ADE6-18CC87CC4ACE}" type="pres">
       <dgm:prSet presAssocID="{CDB4AFFD-35E7-264B-9BBD-A621B18FE722}" presName="node" presStyleLbl="node1" presStyleIdx="2" presStyleCnt="3">
@@ -2513,51 +2324,30 @@
         </dgm:presLayoutVars>
       </dgm:prSet>
       <dgm:spPr/>
-      <dgm:t>
-        <a:bodyPr/>
-        <a:lstStyle/>
-        <a:p>
-          <a:endParaRPr lang="en-US"/>
-        </a:p>
-      </dgm:t>
     </dgm:pt>
     <dgm:pt modelId="{587BAFEE-4925-584C-98DC-D956EB2383A2}" type="pres">
       <dgm:prSet presAssocID="{023F43F1-4240-0640-B914-4E7AE7038AFC}" presName="sibTrans" presStyleLbl="sibTrans2D1" presStyleIdx="2" presStyleCnt="3"/>
       <dgm:spPr/>
-      <dgm:t>
-        <a:bodyPr/>
-        <a:lstStyle/>
-        <a:p>
-          <a:endParaRPr lang="en-US"/>
-        </a:p>
-      </dgm:t>
     </dgm:pt>
     <dgm:pt modelId="{F31AD22F-6A84-7A40-91FB-F8520167703B}" type="pres">
       <dgm:prSet presAssocID="{023F43F1-4240-0640-B914-4E7AE7038AFC}" presName="connectorText" presStyleLbl="sibTrans2D1" presStyleIdx="2" presStyleCnt="3"/>
       <dgm:spPr/>
-      <dgm:t>
-        <a:bodyPr/>
-        <a:lstStyle/>
-        <a:p>
-          <a:endParaRPr lang="en-US"/>
-        </a:p>
-      </dgm:t>
     </dgm:pt>
   </dgm:ptLst>
   <dgm:cxnLst>
-    <dgm:cxn modelId="{4F6A554F-F593-E546-805F-2FA25142AAF4}" srcId="{C236C83C-B288-304E-94BF-E61CD5B8E514}" destId="{CDB4AFFD-35E7-264B-9BBD-A621B18FE722}" srcOrd="2" destOrd="0" parTransId="{D0257083-3B53-434C-B1FA-801D9BC35039}" sibTransId="{023F43F1-4240-0640-B914-4E7AE7038AFC}"/>
-    <dgm:cxn modelId="{B1C173C3-BEF6-714B-8C8F-7B959D3A4BD4}" type="presOf" srcId="{023F43F1-4240-0640-B914-4E7AE7038AFC}" destId="{F31AD22F-6A84-7A40-91FB-F8520167703B}" srcOrd="1" destOrd="0" presId="urn:microsoft.com/office/officeart/2005/8/layout/cycle2"/>
-    <dgm:cxn modelId="{3D408579-6BFF-1F49-835D-EADF52AF94EA}" type="presOf" srcId="{56B83FC8-630A-654C-967A-D3A8D923ADAA}" destId="{135C90DA-3EC2-A54F-866A-BB18EEF25E45}" srcOrd="0" destOrd="0" presId="urn:microsoft.com/office/officeart/2005/8/layout/cycle2"/>
     <dgm:cxn modelId="{802A361D-C68F-8840-A9EB-DA211BF69630}" type="presOf" srcId="{CDB4AFFD-35E7-264B-9BBD-A621B18FE722}" destId="{C80D0CE8-CCC4-254A-ADE6-18CC87CC4ACE}" srcOrd="0" destOrd="0" presId="urn:microsoft.com/office/officeart/2005/8/layout/cycle2"/>
-    <dgm:cxn modelId="{6F47066F-7AA2-784A-AB7D-0BBD009396CB}" type="presOf" srcId="{023F43F1-4240-0640-B914-4E7AE7038AFC}" destId="{587BAFEE-4925-584C-98DC-D956EB2383A2}" srcOrd="0" destOrd="0" presId="urn:microsoft.com/office/officeart/2005/8/layout/cycle2"/>
-    <dgm:cxn modelId="{720F44E5-E8C3-3643-88A9-009D86B4292B}" type="presOf" srcId="{C236C83C-B288-304E-94BF-E61CD5B8E514}" destId="{EDEB5E0A-30F0-A54A-B0F8-F331AEF54BDD}" srcOrd="0" destOrd="0" presId="urn:microsoft.com/office/officeart/2005/8/layout/cycle2"/>
-    <dgm:cxn modelId="{59020AB6-FAED-8F4E-89F4-E3858D7A8820}" srcId="{C236C83C-B288-304E-94BF-E61CD5B8E514}" destId="{3F36FED0-EF5E-1A42-98BA-F725FCC46927}" srcOrd="0" destOrd="0" parTransId="{BBC748EC-79B0-9343-9059-53D2B5251A9F}" sibTransId="{1BDAC051-1D86-9649-9776-B82766636A19}"/>
+    <dgm:cxn modelId="{59C07A25-8738-3D4C-94C9-6067CBFE0131}" type="presOf" srcId="{1BDAC051-1D86-9649-9776-B82766636A19}" destId="{0FC4F28F-3C3C-8D46-A2CB-819F5E0BA797}" srcOrd="0" destOrd="0" presId="urn:microsoft.com/office/officeart/2005/8/layout/cycle2"/>
     <dgm:cxn modelId="{DCABB525-D7FE-6744-BC76-D58344FA1D9E}" srcId="{C236C83C-B288-304E-94BF-E61CD5B8E514}" destId="{56B83FC8-630A-654C-967A-D3A8D923ADAA}" srcOrd="1" destOrd="0" parTransId="{26BF0F39-2F2B-5B4C-92A9-FDADBA7D936C}" sibTransId="{0D7C27DE-7D4D-A847-9D73-17717295B629}"/>
     <dgm:cxn modelId="{7BF73F37-6114-D345-8266-D2FCFFD123BB}" type="presOf" srcId="{3F36FED0-EF5E-1A42-98BA-F725FCC46927}" destId="{94E626C9-F87A-E043-A22D-F6B29DD1EF98}" srcOrd="0" destOrd="0" presId="urn:microsoft.com/office/officeart/2005/8/layout/cycle2"/>
+    <dgm:cxn modelId="{7951DA48-A150-084A-9923-59C3119E7343}" type="presOf" srcId="{0D7C27DE-7D4D-A847-9D73-17717295B629}" destId="{069690A2-A8DE-8D4D-9E05-D20B4AD80AD5}" srcOrd="0" destOrd="0" presId="urn:microsoft.com/office/officeart/2005/8/layout/cycle2"/>
+    <dgm:cxn modelId="{6F47066F-7AA2-784A-AB7D-0BBD009396CB}" type="presOf" srcId="{023F43F1-4240-0640-B914-4E7AE7038AFC}" destId="{587BAFEE-4925-584C-98DC-D956EB2383A2}" srcOrd="0" destOrd="0" presId="urn:microsoft.com/office/officeart/2005/8/layout/cycle2"/>
+    <dgm:cxn modelId="{4F6A554F-F593-E546-805F-2FA25142AAF4}" srcId="{C236C83C-B288-304E-94BF-E61CD5B8E514}" destId="{CDB4AFFD-35E7-264B-9BBD-A621B18FE722}" srcOrd="2" destOrd="0" parTransId="{D0257083-3B53-434C-B1FA-801D9BC35039}" sibTransId="{023F43F1-4240-0640-B914-4E7AE7038AFC}"/>
+    <dgm:cxn modelId="{3D408579-6BFF-1F49-835D-EADF52AF94EA}" type="presOf" srcId="{56B83FC8-630A-654C-967A-D3A8D923ADAA}" destId="{135C90DA-3EC2-A54F-866A-BB18EEF25E45}" srcOrd="0" destOrd="0" presId="urn:microsoft.com/office/officeart/2005/8/layout/cycle2"/>
     <dgm:cxn modelId="{37E2CD8A-B294-6D4A-AF19-F16C6DDE198D}" type="presOf" srcId="{1BDAC051-1D86-9649-9776-B82766636A19}" destId="{05D3C2B6-C474-AA4C-80D9-CA9A6F3D9CE6}" srcOrd="1" destOrd="0" presId="urn:microsoft.com/office/officeart/2005/8/layout/cycle2"/>
-    <dgm:cxn modelId="{59C07A25-8738-3D4C-94C9-6067CBFE0131}" type="presOf" srcId="{1BDAC051-1D86-9649-9776-B82766636A19}" destId="{0FC4F28F-3C3C-8D46-A2CB-819F5E0BA797}" srcOrd="0" destOrd="0" presId="urn:microsoft.com/office/officeart/2005/8/layout/cycle2"/>
-    <dgm:cxn modelId="{7951DA48-A150-084A-9923-59C3119E7343}" type="presOf" srcId="{0D7C27DE-7D4D-A847-9D73-17717295B629}" destId="{069690A2-A8DE-8D4D-9E05-D20B4AD80AD5}" srcOrd="0" destOrd="0" presId="urn:microsoft.com/office/officeart/2005/8/layout/cycle2"/>
     <dgm:cxn modelId="{A68C30A5-A370-E044-9332-DBC89DABAC33}" type="presOf" srcId="{0D7C27DE-7D4D-A847-9D73-17717295B629}" destId="{820F0926-7D71-014F-B7B6-834D588F001B}" srcOrd="1" destOrd="0" presId="urn:microsoft.com/office/officeart/2005/8/layout/cycle2"/>
+    <dgm:cxn modelId="{59020AB6-FAED-8F4E-89F4-E3858D7A8820}" srcId="{C236C83C-B288-304E-94BF-E61CD5B8E514}" destId="{3F36FED0-EF5E-1A42-98BA-F725FCC46927}" srcOrd="0" destOrd="0" parTransId="{BBC748EC-79B0-9343-9059-53D2B5251A9F}" sibTransId="{1BDAC051-1D86-9649-9776-B82766636A19}"/>
+    <dgm:cxn modelId="{B1C173C3-BEF6-714B-8C8F-7B959D3A4BD4}" type="presOf" srcId="{023F43F1-4240-0640-B914-4E7AE7038AFC}" destId="{F31AD22F-6A84-7A40-91FB-F8520167703B}" srcOrd="1" destOrd="0" presId="urn:microsoft.com/office/officeart/2005/8/layout/cycle2"/>
+    <dgm:cxn modelId="{720F44E5-E8C3-3643-88A9-009D86B4292B}" type="presOf" srcId="{C236C83C-B288-304E-94BF-E61CD5B8E514}" destId="{EDEB5E0A-30F0-A54A-B0F8-F331AEF54BDD}" srcOrd="0" destOrd="0" presId="urn:microsoft.com/office/officeart/2005/8/layout/cycle2"/>
     <dgm:cxn modelId="{653CAC5E-6B93-C440-9D25-55DC33004080}" type="presParOf" srcId="{EDEB5E0A-30F0-A54A-B0F8-F331AEF54BDD}" destId="{94E626C9-F87A-E043-A22D-F6B29DD1EF98}" srcOrd="0" destOrd="0" presId="urn:microsoft.com/office/officeart/2005/8/layout/cycle2"/>
     <dgm:cxn modelId="{7FDFAC22-60B4-DA4A-AF26-977728B3BBA9}" type="presParOf" srcId="{EDEB5E0A-30F0-A54A-B0F8-F331AEF54BDD}" destId="{0FC4F28F-3C3C-8D46-A2CB-819F5E0BA797}" srcOrd="1" destOrd="0" presId="urn:microsoft.com/office/officeart/2005/8/layout/cycle2"/>
     <dgm:cxn modelId="{F8DCE869-E807-9F4F-90BE-BEC7C854F205}" type="presParOf" srcId="{0FC4F28F-3C3C-8D46-A2CB-819F5E0BA797}" destId="{05D3C2B6-C474-AA4C-80D9-CA9A6F3D9CE6}" srcOrd="0" destOrd="0" presId="urn:microsoft.com/office/officeart/2005/8/layout/cycle2"/>
@@ -2644,7 +2434,7 @@
         </a:bodyPr>
         <a:lstStyle/>
         <a:p>
-          <a:pPr lvl="0" algn="ctr" defTabSz="711200">
+          <a:pPr marL="0" lvl="0" indent="0" algn="ctr" defTabSz="711200">
             <a:lnSpc>
               <a:spcPct val="90000"/>
             </a:lnSpc>
@@ -2654,12 +2444,12 @@
             <a:spcAft>
               <a:spcPct val="35000"/>
             </a:spcAft>
+            <a:buNone/>
           </a:pPr>
           <a:r>
-            <a:rPr lang="en-US" sz="1600" kern="1200" dirty="0" smtClean="0"/>
+            <a:rPr lang="en-US" sz="1600" kern="1200" dirty="0"/>
             <a:t>make change</a:t>
           </a:r>
-          <a:endParaRPr lang="en-US" sz="1600" kern="1200" dirty="0"/>
         </a:p>
       </dsp:txBody>
       <dsp:txXfrm>
@@ -2723,7 +2513,7 @@
         </a:bodyPr>
         <a:lstStyle/>
         <a:p>
-          <a:pPr lvl="0" algn="ctr" defTabSz="577850">
+          <a:pPr marL="0" lvl="0" indent="0" algn="ctr" defTabSz="577850">
             <a:lnSpc>
               <a:spcPct val="90000"/>
             </a:lnSpc>
@@ -2733,6 +2523,7 @@
             <a:spcAft>
               <a:spcPct val="35000"/>
             </a:spcAft>
+            <a:buNone/>
           </a:pPr>
           <a:endParaRPr lang="en-US" sz="1300" kern="1200"/>
         </a:p>
@@ -2802,7 +2593,7 @@
         </a:bodyPr>
         <a:lstStyle/>
         <a:p>
-          <a:pPr lvl="0" algn="ctr" defTabSz="711200">
+          <a:pPr marL="0" lvl="0" indent="0" algn="ctr" defTabSz="711200">
             <a:lnSpc>
               <a:spcPct val="90000"/>
             </a:lnSpc>
@@ -2812,12 +2603,12 @@
             <a:spcAft>
               <a:spcPct val="35000"/>
             </a:spcAft>
+            <a:buNone/>
           </a:pPr>
           <a:r>
-            <a:rPr lang="en-US" sz="1600" kern="1200" dirty="0" smtClean="0"/>
+            <a:rPr lang="en-US" sz="1600" kern="1200" dirty="0"/>
             <a:t>upload cookbook</a:t>
           </a:r>
-          <a:endParaRPr lang="en-US" sz="1600" kern="1200" dirty="0"/>
         </a:p>
       </dsp:txBody>
       <dsp:txXfrm>
@@ -2881,7 +2672,7 @@
         </a:bodyPr>
         <a:lstStyle/>
         <a:p>
-          <a:pPr lvl="0" algn="ctr" defTabSz="577850">
+          <a:pPr marL="0" lvl="0" indent="0" algn="ctr" defTabSz="577850">
             <a:lnSpc>
               <a:spcPct val="90000"/>
             </a:lnSpc>
@@ -2891,6 +2682,7 @@
             <a:spcAft>
               <a:spcPct val="35000"/>
             </a:spcAft>
+            <a:buNone/>
           </a:pPr>
           <a:endParaRPr lang="en-US" sz="1300" kern="1200"/>
         </a:p>
@@ -2960,7 +2752,7 @@
         </a:bodyPr>
         <a:lstStyle/>
         <a:p>
-          <a:pPr lvl="0" algn="ctr" defTabSz="711200">
+          <a:pPr marL="0" lvl="0" indent="0" algn="ctr" defTabSz="711200">
             <a:lnSpc>
               <a:spcPct val="90000"/>
             </a:lnSpc>
@@ -2970,12 +2762,12 @@
             <a:spcAft>
               <a:spcPct val="35000"/>
             </a:spcAft>
+            <a:buNone/>
           </a:pPr>
           <a:r>
-            <a:rPr lang="en-US" sz="1600" kern="1200" dirty="0" smtClean="0"/>
+            <a:rPr lang="en-US" sz="1600" kern="1200" dirty="0"/>
             <a:t>provision machine</a:t>
           </a:r>
-          <a:endParaRPr lang="en-US" sz="1600" kern="1200" dirty="0"/>
         </a:p>
       </dsp:txBody>
       <dsp:txXfrm>
@@ -3039,7 +2831,7 @@
         </a:bodyPr>
         <a:lstStyle/>
         <a:p>
-          <a:pPr lvl="0" algn="ctr" defTabSz="577850">
+          <a:pPr marL="0" lvl="0" indent="0" algn="ctr" defTabSz="577850">
             <a:lnSpc>
               <a:spcPct val="90000"/>
             </a:lnSpc>
@@ -3049,6 +2841,7 @@
             <a:spcAft>
               <a:spcPct val="35000"/>
             </a:spcAft>
+            <a:buNone/>
           </a:pPr>
           <a:endParaRPr lang="en-US" sz="1300" kern="1200"/>
         </a:p>
@@ -3118,7 +2911,7 @@
         </a:bodyPr>
         <a:lstStyle/>
         <a:p>
-          <a:pPr lvl="0" algn="ctr" defTabSz="711200">
+          <a:pPr marL="0" lvl="0" indent="0" algn="ctr" defTabSz="711200">
             <a:lnSpc>
               <a:spcPct val="90000"/>
             </a:lnSpc>
@@ -3128,12 +2921,12 @@
             <a:spcAft>
               <a:spcPct val="35000"/>
             </a:spcAft>
+            <a:buNone/>
           </a:pPr>
           <a:r>
-            <a:rPr lang="en-US" sz="1600" kern="1200" dirty="0" smtClean="0"/>
+            <a:rPr lang="en-US" sz="1600" kern="1200" dirty="0"/>
             <a:t>bootstrap machine</a:t>
           </a:r>
-          <a:endParaRPr lang="en-US" sz="1600" kern="1200" dirty="0"/>
         </a:p>
       </dsp:txBody>
       <dsp:txXfrm>
@@ -3197,7 +2990,7 @@
         </a:bodyPr>
         <a:lstStyle/>
         <a:p>
-          <a:pPr lvl="0" algn="ctr" defTabSz="577850">
+          <a:pPr marL="0" lvl="0" indent="0" algn="ctr" defTabSz="577850">
             <a:lnSpc>
               <a:spcPct val="90000"/>
             </a:lnSpc>
@@ -3207,6 +3000,7 @@
             <a:spcAft>
               <a:spcPct val="35000"/>
             </a:spcAft>
+            <a:buNone/>
           </a:pPr>
           <a:endParaRPr lang="en-US" sz="1300" kern="1200"/>
         </a:p>
@@ -3276,7 +3070,7 @@
         </a:bodyPr>
         <a:lstStyle/>
         <a:p>
-          <a:pPr lvl="0" algn="ctr" defTabSz="711200">
+          <a:pPr marL="0" lvl="0" indent="0" algn="ctr" defTabSz="711200">
             <a:lnSpc>
               <a:spcPct val="90000"/>
             </a:lnSpc>
@@ -3286,12 +3080,12 @@
             <a:spcAft>
               <a:spcPct val="35000"/>
             </a:spcAft>
+            <a:buNone/>
           </a:pPr>
           <a:r>
-            <a:rPr lang="en-US" sz="1600" kern="1200" dirty="0" smtClean="0"/>
+            <a:rPr lang="en-US" sz="1600" kern="1200" dirty="0"/>
             <a:t>run chef-client</a:t>
           </a:r>
-          <a:endParaRPr lang="en-US" sz="1600" kern="1200" dirty="0"/>
         </a:p>
       </dsp:txBody>
       <dsp:txXfrm>
@@ -3355,7 +3149,7 @@
         </a:bodyPr>
         <a:lstStyle/>
         <a:p>
-          <a:pPr lvl="0" algn="ctr" defTabSz="577850">
+          <a:pPr marL="0" lvl="0" indent="0" algn="ctr" defTabSz="577850">
             <a:lnSpc>
               <a:spcPct val="90000"/>
             </a:lnSpc>
@@ -3365,6 +3159,7 @@
             <a:spcAft>
               <a:spcPct val="35000"/>
             </a:spcAft>
+            <a:buNone/>
           </a:pPr>
           <a:endParaRPr lang="en-US" sz="1300" kern="1200"/>
         </a:p>
@@ -3429,7 +3224,7 @@
         </a:bodyPr>
         <a:lstStyle/>
         <a:p>
-          <a:pPr lvl="0" algn="ctr" defTabSz="711200">
+          <a:pPr marL="0" lvl="0" indent="0" algn="ctr" defTabSz="711200">
             <a:lnSpc>
               <a:spcPct val="90000"/>
             </a:lnSpc>
@@ -3439,13 +3234,14 @@
             <a:spcAft>
               <a:spcPct val="35000"/>
             </a:spcAft>
+            <a:buNone/>
           </a:pPr>
           <a:r>
-            <a:rPr lang="en-US" sz="1600" kern="1200" dirty="0" smtClean="0"/>
+            <a:rPr lang="en-US" sz="1600" kern="1200" dirty="0"/>
             <a:t>ad hoc</a:t>
           </a:r>
           <a:r>
-            <a:rPr lang="en-US" sz="1600" kern="1200" baseline="0" dirty="0" smtClean="0"/>
+            <a:rPr lang="en-US" sz="1600" kern="1200" baseline="0" dirty="0"/>
             <a:t> verification</a:t>
           </a:r>
           <a:endParaRPr lang="en-US" sz="1600" kern="1200" dirty="0"/>
@@ -3512,7 +3308,7 @@
         </a:bodyPr>
         <a:lstStyle/>
         <a:p>
-          <a:pPr lvl="0" algn="ctr" defTabSz="577850">
+          <a:pPr marL="0" lvl="0" indent="0" algn="ctr" defTabSz="577850">
             <a:lnSpc>
               <a:spcPct val="90000"/>
             </a:lnSpc>
@@ -3522,6 +3318,7 @@
             <a:spcAft>
               <a:spcPct val="35000"/>
             </a:spcAft>
+            <a:buNone/>
           </a:pPr>
           <a:endParaRPr lang="en-US" sz="1300" kern="1200"/>
         </a:p>
@@ -3593,7 +3390,7 @@
         </a:bodyPr>
         <a:lstStyle/>
         <a:p>
-          <a:pPr lvl="0" algn="ctr" defTabSz="1289050">
+          <a:pPr marL="0" lvl="0" indent="0" algn="ctr" defTabSz="1289050">
             <a:lnSpc>
               <a:spcPct val="90000"/>
             </a:lnSpc>
@@ -3603,12 +3400,12 @@
             <a:spcAft>
               <a:spcPct val="35000"/>
             </a:spcAft>
+            <a:buNone/>
           </a:pPr>
           <a:r>
-            <a:rPr lang="en-US" sz="2900" kern="1200" dirty="0" smtClean="0"/>
+            <a:rPr lang="en-US" sz="2900" kern="1200" dirty="0"/>
             <a:t>make change</a:t>
           </a:r>
-          <a:endParaRPr lang="en-US" sz="2900" kern="1200" dirty="0"/>
         </a:p>
       </dsp:txBody>
       <dsp:txXfrm>
@@ -3672,7 +3469,7 @@
         </a:bodyPr>
         <a:lstStyle/>
         <a:p>
-          <a:pPr lvl="0" algn="ctr" defTabSz="1066800">
+          <a:pPr marL="0" lvl="0" indent="0" algn="ctr" defTabSz="1066800">
             <a:lnSpc>
               <a:spcPct val="90000"/>
             </a:lnSpc>
@@ -3682,6 +3479,7 @@
             <a:spcAft>
               <a:spcPct val="35000"/>
             </a:spcAft>
+            <a:buNone/>
           </a:pPr>
           <a:endParaRPr lang="en-US" sz="2400" kern="1200"/>
         </a:p>
@@ -3751,7 +3549,7 @@
         </a:bodyPr>
         <a:lstStyle/>
         <a:p>
-          <a:pPr lvl="0" algn="ctr" defTabSz="1289050">
+          <a:pPr marL="0" lvl="0" indent="0" algn="ctr" defTabSz="1289050">
             <a:lnSpc>
               <a:spcPct val="90000"/>
             </a:lnSpc>
@@ -3761,12 +3559,12 @@
             <a:spcAft>
               <a:spcPct val="35000"/>
             </a:spcAft>
+            <a:buNone/>
           </a:pPr>
           <a:r>
-            <a:rPr lang="en-US" sz="2900" kern="1200" dirty="0" smtClean="0"/>
+            <a:rPr lang="en-US" sz="2900" kern="1200" dirty="0"/>
             <a:t>run testing tools</a:t>
           </a:r>
-          <a:endParaRPr lang="en-US" sz="2900" kern="1200" dirty="0"/>
         </a:p>
       </dsp:txBody>
       <dsp:txXfrm>
@@ -3830,7 +3628,7 @@
         </a:bodyPr>
         <a:lstStyle/>
         <a:p>
-          <a:pPr lvl="0" algn="ctr" defTabSz="1066800">
+          <a:pPr marL="0" lvl="0" indent="0" algn="ctr" defTabSz="1066800">
             <a:lnSpc>
               <a:spcPct val="90000"/>
             </a:lnSpc>
@@ -3840,6 +3638,7 @@
             <a:spcAft>
               <a:spcPct val="35000"/>
             </a:spcAft>
+            <a:buNone/>
           </a:pPr>
           <a:endParaRPr lang="en-US" sz="2400" kern="1200"/>
         </a:p>
@@ -3904,7 +3703,7 @@
         </a:bodyPr>
         <a:lstStyle/>
         <a:p>
-          <a:pPr lvl="0" algn="ctr" defTabSz="1289050">
+          <a:pPr marL="0" lvl="0" indent="0" algn="ctr" defTabSz="1289050">
             <a:lnSpc>
               <a:spcPct val="90000"/>
             </a:lnSpc>
@@ -3914,13 +3713,14 @@
             <a:spcAft>
               <a:spcPct val="35000"/>
             </a:spcAft>
+            <a:buNone/>
           </a:pPr>
           <a:r>
-            <a:rPr lang="en-US" sz="2900" kern="1200" dirty="0" smtClean="0"/>
+            <a:rPr lang="en-US" sz="2900" kern="1200" dirty="0"/>
             <a:t>automated</a:t>
           </a:r>
           <a:r>
-            <a:rPr lang="en-US" sz="2900" kern="1200" baseline="0" dirty="0" smtClean="0"/>
+            <a:rPr lang="en-US" sz="2900" kern="1200" baseline="0" dirty="0"/>
             <a:t> verification</a:t>
           </a:r>
           <a:endParaRPr lang="en-US" sz="2900" kern="1200" dirty="0"/>
@@ -3987,7 +3787,7 @@
         </a:bodyPr>
         <a:lstStyle/>
         <a:p>
-          <a:pPr lvl="0" algn="ctr" defTabSz="1066800">
+          <a:pPr marL="0" lvl="0" indent="0" algn="ctr" defTabSz="1066800">
             <a:lnSpc>
               <a:spcPct val="90000"/>
             </a:lnSpc>
@@ -3997,6 +3797,7 @@
             <a:spcAft>
               <a:spcPct val="35000"/>
             </a:spcAft>
+            <a:buNone/>
           </a:pPr>
           <a:endParaRPr lang="en-US" sz="2400" kern="1200"/>
         </a:p>
@@ -6563,10 +6364,9 @@
               <a:defRPr/>
             </a:pPr>
             <a:r>
-              <a:rPr lang="en-US" smtClean="0"/>
+              <a:rPr lang="en-US"/>
               <a:t>Chef Intermediate</a:t>
             </a:r>
-            <a:endParaRPr lang="en-US"/>
           </a:p>
         </p:txBody>
       </p:sp>
@@ -6611,7 +6411,7 @@
               <a:defRPr/>
             </a:pPr>
             <a:r>
-              <a:rPr lang="en-US" smtClean="0"/>
+              <a:rPr lang="en-US"/>
               <a:t>Chef Software, Inc.</a:t>
             </a:r>
             <a:endParaRPr lang="en-US" dirty="0"/>
@@ -6791,7 +6591,7 @@
               <a:defRPr/>
             </a:pPr>
             <a:r>
-              <a:rPr lang="en-US" smtClean="0"/>
+              <a:rPr lang="en-US"/>
               <a:t>Chef Software, Inc.</a:t>
             </a:r>
             <a:endParaRPr lang="en-US" dirty="0"/>
@@ -6859,38 +6659,37 @@
           <a:p>
             <a:pPr lvl="0"/>
             <a:r>
-              <a:rPr lang="en-US" noProof="0" dirty="0" smtClean="0"/>
+              <a:rPr lang="en-US" noProof="0" dirty="0"/>
               <a:t>Click to edit Master text styles</a:t>
             </a:r>
           </a:p>
           <a:p>
             <a:pPr lvl="1"/>
             <a:r>
-              <a:rPr lang="en-US" noProof="0" dirty="0" smtClean="0"/>
+              <a:rPr lang="en-US" noProof="0" dirty="0"/>
               <a:t>Second level</a:t>
             </a:r>
           </a:p>
           <a:p>
             <a:pPr lvl="2"/>
             <a:r>
-              <a:rPr lang="en-US" noProof="0" dirty="0" smtClean="0"/>
+              <a:rPr lang="en-US" noProof="0" dirty="0"/>
               <a:t>Third level</a:t>
             </a:r>
           </a:p>
           <a:p>
             <a:pPr lvl="3"/>
             <a:r>
-              <a:rPr lang="en-US" noProof="0" dirty="0" smtClean="0"/>
+              <a:rPr lang="en-US" noProof="0" dirty="0"/>
               <a:t>Fourth level</a:t>
             </a:r>
           </a:p>
           <a:p>
             <a:pPr lvl="4"/>
             <a:r>
-              <a:rPr lang="en-US" noProof="0" dirty="0" smtClean="0"/>
+              <a:rPr lang="en-US" noProof="0" dirty="0"/>
               <a:t>Fifth level</a:t>
             </a:r>
-            <a:endParaRPr lang="en-US" noProof="0" dirty="0"/>
           </a:p>
         </p:txBody>
       </p:sp>
@@ -6935,7 +6734,7 @@
               <a:defRPr/>
             </a:pPr>
             <a:r>
-              <a:rPr lang="en-US" smtClean="0"/>
+              <a:rPr lang="en-US"/>
               <a:t>Chef Intermediate</a:t>
             </a:r>
             <a:endParaRPr lang="en-US" dirty="0"/>
@@ -7144,12 +6943,12 @@
           <a:lstStyle/>
           <a:p>
             <a:r>
-              <a:rPr lang="en-US" dirty="0" smtClean="0"/>
+              <a:rPr lang="en-US" dirty="0"/>
               <a:t>Wh</a:t>
             </a:r>
             <a:r>
-              <a:rPr lang="en-US" baseline="0" dirty="0" smtClean="0"/>
-              <a:t>y should you write tests? Why is important that we write tests for the recipes and the cookbooks that we define. Some of you here may be because you are starting to see an importance to what testing can provide. Others of you may not be convinced. Wherever you stand the real reason you came here to learn is to break down the barriers that make testing hard. Because testing is hard!</a:t>
+              <a:rPr lang="en-US" baseline="0" dirty="0"/>
+              <a:t>y should you write tests? Why is important that we write tests for the recipes and the cookbooks that we define. Some of you here may be because you are starting to see an importance to what testing can provide. Others of you may not be convinced. Wherever you stand, the real reason you came here to learn is to break down the barriers that make testing hard. Because testing is hard!</a:t>
             </a:r>
           </a:p>
         </p:txBody>
@@ -7173,7 +6972,7 @@
               <a:defRPr/>
             </a:pPr>
             <a:r>
-              <a:rPr lang="en-US" smtClean="0"/>
+              <a:rPr lang="en-US"/>
               <a:t>Chef Intermediate</a:t>
             </a:r>
             <a:endParaRPr lang="en-US" dirty="0"/>
@@ -7199,7 +6998,7 @@
               <a:defRPr/>
             </a:pPr>
             <a:r>
-              <a:rPr lang="en-US" smtClean="0"/>
+              <a:rPr lang="en-US"/>
               <a:t>Chef Software, Inc.</a:t>
             </a:r>
             <a:endParaRPr lang="en-US" dirty="0"/>
@@ -7264,20 +7063,20 @@
           <a:lstStyle/>
           <a:p>
             <a:r>
-              <a:rPr lang="en-US" dirty="0" smtClean="0"/>
+              <a:rPr lang="en-US" dirty="0"/>
               <a:t>You may</a:t>
             </a:r>
             <a:r>
-              <a:rPr lang="en-US" baseline="0" dirty="0" smtClean="0"/>
+              <a:rPr lang="en-US" baseline="0" dirty="0"/>
               <a:t> or may not be convinced that there is value in writing and executing tests. If the opinions we all have expressed has not convinced you I encourage you to continue to find more discussions where you can hear more opinions and share yours with others. It is important to have these discussions within your teams and your organization.</a:t>
             </a:r>
           </a:p>
           <a:p>
-            <a:endParaRPr lang="en-US" baseline="0" dirty="0" smtClean="0"/>
-          </a:p>
-          <a:p>
-            <a:r>
-              <a:rPr lang="en-US" baseline="0" dirty="0" smtClean="0"/>
+            <a:endParaRPr lang="en-US" baseline="0" dirty="0"/>
+          </a:p>
+          <a:p>
+            <a:r>
+              <a:rPr lang="en-US" baseline="0" dirty="0"/>
               <a:t>I want to now focus the discussion on the reasons why writing tests are hard. Similar to the previous discussion I want to provide my opinion to start the discussion. I want you to also contribute your opinions and experiences as they are equally valuable.</a:t>
             </a:r>
             <a:endParaRPr lang="en-US" dirty="0"/>
@@ -7303,10 +7102,9 @@
               <a:defRPr/>
             </a:pPr>
             <a:r>
-              <a:rPr lang="en-US" smtClean="0"/>
+              <a:rPr lang="en-US"/>
               <a:t>Chef Intermediate</a:t>
             </a:r>
-            <a:endParaRPr lang="en-US"/>
           </a:p>
         </p:txBody>
       </p:sp>
@@ -7329,7 +7127,7 @@
               <a:defRPr/>
             </a:pPr>
             <a:r>
-              <a:rPr lang="en-US" smtClean="0"/>
+              <a:rPr lang="en-US"/>
               <a:t>Chef Software, Inc.</a:t>
             </a:r>
             <a:endParaRPr lang="en-US" dirty="0"/>
@@ -7394,20 +7192,20 @@
           <a:lstStyle/>
           <a:p>
             <a:r>
-              <a:rPr lang="en-US" dirty="0" smtClean="0"/>
+              <a:rPr lang="en-US" dirty="0"/>
               <a:t>The</a:t>
             </a:r>
             <a:r>
-              <a:rPr lang="en-US" baseline="0" dirty="0" smtClean="0"/>
+              <a:rPr lang="en-US" baseline="0" dirty="0"/>
               <a:t> language you use to define your tests in is not the same as the language you use to compose your original intentions. To test your code you need to write more code. However, this new code that you write is different as you are expressing your desired expectations of the system across a number of scenarios. This requires you to learn one or more new languages which have completely new systems and structures.</a:t>
             </a:r>
           </a:p>
           <a:p>
-            <a:endParaRPr lang="en-US" baseline="0" dirty="0" smtClean="0"/>
-          </a:p>
-          <a:p>
-            <a:r>
-              <a:rPr lang="en-US" baseline="0" dirty="0" smtClean="0"/>
+            <a:endParaRPr lang="en-US" baseline="0" dirty="0"/>
+          </a:p>
+          <a:p>
+            <a:r>
+              <a:rPr lang="en-US" baseline="0" dirty="0"/>
               <a:t>Testing asks you to solve a different problem in a different order when compared to process of writing software. You have to overcome particular challenges created by an implementation and express the desired expectations of that implementation before it is even built.</a:t>
             </a:r>
           </a:p>
@@ -7432,10 +7230,9 @@
               <a:defRPr/>
             </a:pPr>
             <a:r>
-              <a:rPr lang="en-US" smtClean="0"/>
+              <a:rPr lang="en-US"/>
               <a:t>Chef Intermediate</a:t>
             </a:r>
-            <a:endParaRPr lang="en-US"/>
           </a:p>
         </p:txBody>
       </p:sp>
@@ -7458,7 +7255,7 @@
               <a:defRPr/>
             </a:pPr>
             <a:r>
-              <a:rPr lang="en-US" smtClean="0"/>
+              <a:rPr lang="en-US"/>
               <a:t>Chef Software, Inc.</a:t>
             </a:r>
             <a:endParaRPr lang="en-US" dirty="0"/>
@@ -7523,11 +7320,11 @@
           <a:lstStyle/>
           <a:p>
             <a:r>
-              <a:rPr lang="en-US" dirty="0" smtClean="0"/>
+              <a:rPr lang="en-US" dirty="0"/>
               <a:t>Testing</a:t>
             </a:r>
             <a:r>
-              <a:rPr lang="en-US" baseline="0" dirty="0" smtClean="0"/>
+              <a:rPr lang="en-US" baseline="0" dirty="0"/>
               <a:t> also asks you to change your behaviors through the new tools required to execute the tests. These tools represent a huge domain of knowledge expressed in all the commands, flags, and configuration that must be understood to be used correctly and then effectively as the complexity of your testing tools grow. The largest, and most immediate impact is on your development workflow which has to adopt new steps that feel unsure and even more unreliable as you receive a barrage of feedback in unfamiliar formats.</a:t>
             </a:r>
             <a:endParaRPr lang="en-US" dirty="0"/>
@@ -7553,10 +7350,9 @@
               <a:defRPr/>
             </a:pPr>
             <a:r>
-              <a:rPr lang="en-US" smtClean="0"/>
+              <a:rPr lang="en-US"/>
               <a:t>Chef Intermediate</a:t>
             </a:r>
-            <a:endParaRPr lang="en-US"/>
           </a:p>
         </p:txBody>
       </p:sp>
@@ -7579,7 +7375,7 @@
               <a:defRPr/>
             </a:pPr>
             <a:r>
-              <a:rPr lang="en-US" smtClean="0"/>
+              <a:rPr lang="en-US"/>
               <a:t>Chef Software, Inc.</a:t>
             </a:r>
             <a:endParaRPr lang="en-US" dirty="0"/>
@@ -7661,18 +7457,18 @@
               <a:defRPr/>
             </a:pPr>
             <a:r>
-              <a:rPr lang="en-US" dirty="0" smtClean="0"/>
+              <a:rPr lang="en-US" dirty="0"/>
               <a:t>I shared with you my opinion on why</a:t>
             </a:r>
             <a:r>
-              <a:rPr lang="en-US" baseline="0" dirty="0" smtClean="0"/>
+              <a:rPr lang="en-US" baseline="0" dirty="0"/>
               <a:t> I think it is hard to write tests. Now I would like to understand what reasons you see that make </a:t>
             </a:r>
             <a:r>
-              <a:rPr lang="en-US" baseline="0" smtClean="0"/>
+              <a:rPr lang="en-US" baseline="0"/>
               <a:t>testing hard.</a:t>
             </a:r>
-            <a:endParaRPr lang="en-US" baseline="0" dirty="0" smtClean="0"/>
+            <a:endParaRPr lang="en-US" baseline="0" dirty="0"/>
           </a:p>
           <a:p>
             <a:pPr marL="0" marR="0" indent="0" algn="l" defTabSz="1217613" rtl="0" eaLnBrk="1" fontAlgn="base" latinLnBrk="0" hangingPunct="1">
@@ -7692,7 +7488,7 @@
               <a:tabLst/>
               <a:defRPr/>
             </a:pPr>
-            <a:endParaRPr lang="en-US" baseline="0" dirty="0" smtClean="0"/>
+            <a:endParaRPr lang="en-US" baseline="0" dirty="0"/>
           </a:p>
           <a:p>
             <a:pPr marL="0" marR="0" indent="0" algn="l" defTabSz="1217613" rtl="0" eaLnBrk="1" fontAlgn="base" latinLnBrk="0" hangingPunct="1">
@@ -7713,7 +7509,7 @@
               <a:defRPr/>
             </a:pPr>
             <a:r>
-              <a:rPr lang="en-US" baseline="0" dirty="0" smtClean="0"/>
+              <a:rPr lang="en-US" baseline="0" dirty="0"/>
               <a:t>After we have expressed a set of reasons we should leave time within the discussion to discuss ways in which you have made it less hard.</a:t>
             </a:r>
           </a:p>
@@ -7735,14 +7531,14 @@
               <a:tabLst/>
               <a:defRPr/>
             </a:pPr>
-            <a:endParaRPr lang="en-US" baseline="0" dirty="0" smtClean="0"/>
-          </a:p>
-          <a:p>
-            <a:r>
-              <a:rPr lang="en-US" baseline="0" dirty="0" smtClean="0"/>
+            <a:endParaRPr lang="en-US" baseline="0" dirty="0"/>
+          </a:p>
+          <a:p>
+            <a:r>
+              <a:rPr lang="en-US" baseline="0" dirty="0"/>
               <a:t>Instructor Note: With large groups I often find it better to have individuals turn to the individuals around them, form groups of whatever size they feel comfortable, and have them take turns asking and answering the questions. When all the groups are done I then open the discussion up to the entire group allowing each group or individuals to share their answers.</a:t>
             </a:r>
-            <a:endParaRPr lang="en-US" dirty="0" smtClean="0"/>
+            <a:endParaRPr lang="en-US" dirty="0"/>
           </a:p>
           <a:p>
             <a:endParaRPr lang="en-US" dirty="0"/>
@@ -7768,10 +7564,9 @@
               <a:defRPr/>
             </a:pPr>
             <a:r>
-              <a:rPr lang="en-US" smtClean="0"/>
+              <a:rPr lang="en-US"/>
               <a:t>Chef Intermediate</a:t>
             </a:r>
-            <a:endParaRPr lang="en-US"/>
           </a:p>
         </p:txBody>
       </p:sp>
@@ -7794,7 +7589,7 @@
               <a:defRPr/>
             </a:pPr>
             <a:r>
-              <a:rPr lang="en-US" smtClean="0"/>
+              <a:rPr lang="en-US"/>
               <a:t>Chef Software, Inc.</a:t>
             </a:r>
             <a:endParaRPr lang="en-US" dirty="0"/>
@@ -7876,14 +7671,14 @@
               <a:defRPr/>
             </a:pPr>
             <a:r>
-              <a:rPr lang="en-US" baseline="0" dirty="0" smtClean="0"/>
+              <a:rPr lang="en-US" baseline="0" dirty="0"/>
               <a:t>With our two discussions complete lets pause now for any questions that were not covered or even came out of </a:t>
             </a:r>
             <a:r>
-              <a:rPr lang="en-US" baseline="0" smtClean="0"/>
+              <a:rPr lang="en-US" baseline="0"/>
               <a:t>the discussions.</a:t>
             </a:r>
-            <a:endParaRPr lang="en-US" baseline="0" dirty="0" smtClean="0"/>
+            <a:endParaRPr lang="en-US" baseline="0" dirty="0"/>
           </a:p>
         </p:txBody>
       </p:sp>
@@ -7906,10 +7701,9 @@
               <a:defRPr/>
             </a:pPr>
             <a:r>
-              <a:rPr lang="en-US" smtClean="0"/>
+              <a:rPr lang="en-US"/>
               <a:t>Chef Intermediate</a:t>
             </a:r>
-            <a:endParaRPr lang="en-US"/>
           </a:p>
         </p:txBody>
       </p:sp>
@@ -7932,7 +7726,7 @@
               <a:defRPr/>
             </a:pPr>
             <a:r>
-              <a:rPr lang="en-US" smtClean="0"/>
+              <a:rPr lang="en-US"/>
               <a:t>Chef Software, Inc.</a:t>
             </a:r>
             <a:endParaRPr lang="en-US" dirty="0"/>
@@ -7997,11 +7791,11 @@
           <a:lstStyle/>
           <a:p>
             <a:r>
-              <a:rPr lang="en-US" dirty="0" smtClean="0"/>
+              <a:rPr lang="en-US" dirty="0"/>
               <a:t>Before</a:t>
             </a:r>
             <a:r>
-              <a:rPr lang="en-US" baseline="0" dirty="0" smtClean="0"/>
+              <a:rPr lang="en-US" baseline="0" dirty="0"/>
               <a:t> we complete this section and start learning some of these new tools and languages let us pause for questions.</a:t>
             </a:r>
             <a:endParaRPr lang="en-US" dirty="0"/>
@@ -8027,10 +7821,9 @@
               <a:defRPr/>
             </a:pPr>
             <a:r>
-              <a:rPr lang="en-US" smtClean="0"/>
+              <a:rPr lang="en-US"/>
               <a:t>Chef Intermediate</a:t>
             </a:r>
-            <a:endParaRPr lang="en-US"/>
           </a:p>
         </p:txBody>
       </p:sp>
@@ -8053,7 +7846,7 @@
               <a:defRPr/>
             </a:pPr>
             <a:r>
-              <a:rPr lang="en-US" smtClean="0"/>
+              <a:rPr lang="en-US"/>
               <a:t>Chef Software, Inc.</a:t>
             </a:r>
             <a:endParaRPr lang="en-US" dirty="0"/>
@@ -8140,7 +7933,7 @@
               <a:defRPr/>
             </a:pPr>
             <a:r>
-              <a:rPr lang="en-US" smtClean="0"/>
+              <a:rPr lang="en-US"/>
               <a:t>Chef Software, Inc.</a:t>
             </a:r>
             <a:endParaRPr lang="en-US" dirty="0"/>
@@ -8166,10 +7959,9 @@
               <a:defRPr/>
             </a:pPr>
             <a:r>
-              <a:rPr lang="en-US" smtClean="0"/>
+              <a:rPr lang="en-US"/>
               <a:t>Chef Intermediate</a:t>
             </a:r>
-            <a:endParaRPr lang="en-US"/>
           </a:p>
         </p:txBody>
       </p:sp>
@@ -8248,7 +8040,7 @@
               <a:defRPr/>
             </a:pPr>
             <a:r>
-              <a:rPr lang="en-US" baseline="0" dirty="0" smtClean="0"/>
+              <a:rPr lang="en-US" baseline="0" dirty="0"/>
               <a:t>All of you likely have a personal answer or opinions to these questions. Good. Capture those because we will have a discussion together. To start the discussion I will provide my thoughts and opinions about why I think it is important to write tests. Then I want you to share your thoughts. Then we will discuss the many reasons that testing is hard.</a:t>
             </a:r>
           </a:p>
@@ -8273,10 +8065,9 @@
               <a:defRPr/>
             </a:pPr>
             <a:r>
-              <a:rPr lang="en-US" smtClean="0"/>
+              <a:rPr lang="en-US"/>
               <a:t>Chef Intermediate</a:t>
             </a:r>
-            <a:endParaRPr lang="en-US"/>
           </a:p>
         </p:txBody>
       </p:sp>
@@ -8299,7 +8090,7 @@
               <a:defRPr/>
             </a:pPr>
             <a:r>
-              <a:rPr lang="en-US" smtClean="0"/>
+              <a:rPr lang="en-US"/>
               <a:t>Chef Software, Inc.</a:t>
             </a:r>
             <a:endParaRPr lang="en-US" dirty="0"/>
@@ -8381,7 +8172,7 @@
               <a:defRPr/>
             </a:pPr>
             <a:r>
-              <a:rPr lang="en-US" baseline="0" dirty="0" smtClean="0"/>
+              <a:rPr lang="en-US" baseline="0" dirty="0"/>
               <a:t>To understand why it is important to write tests I believe it is important to examine the current cookbook development workflow that most individuals employ.</a:t>
             </a:r>
           </a:p>
@@ -8404,7 +8195,7 @@
               <a:defRPr/>
             </a:pPr>
             <a:r>
-              <a:rPr lang="en-US" baseline="0" dirty="0" smtClean="0"/>
+              <a:rPr lang="en-US" baseline="0" dirty="0"/>
               <a:t>To provide a few answers to why writing tests are powerful and why are they hard to write we need to look at our current cookbook development workflow.</a:t>
             </a:r>
           </a:p>
@@ -8426,7 +8217,7 @@
               <a:tabLst/>
               <a:defRPr/>
             </a:pPr>
-            <a:endParaRPr lang="en-US" baseline="0" dirty="0" smtClean="0"/>
+            <a:endParaRPr lang="en-US" baseline="0" dirty="0"/>
           </a:p>
           <a:p>
             <a:pPr marL="0" marR="0" indent="0" algn="l" defTabSz="1217613" rtl="0" eaLnBrk="1" fontAlgn="base" latinLnBrk="0" hangingPunct="1">
@@ -8447,7 +8238,7 @@
               <a:defRPr/>
             </a:pPr>
             <a:r>
-              <a:rPr lang="en-US" baseline="0" dirty="0" smtClean="0"/>
+              <a:rPr lang="en-US" baseline="0" dirty="0"/>
               <a:t>On your local workstation you will write cookbook code. Creating a new recipe to meet new requirements, fixing a bug in an existing recipe, or refactoring complicated recipes into several smaller recipes, helper methods, or maybe even a custom resource.</a:t>
             </a:r>
           </a:p>
@@ -8469,7 +8260,7 @@
               <a:tabLst/>
               <a:defRPr/>
             </a:pPr>
-            <a:endParaRPr lang="en-US" baseline="0" dirty="0" smtClean="0"/>
+            <a:endParaRPr lang="en-US" baseline="0" dirty="0"/>
           </a:p>
           <a:p>
             <a:pPr marL="0" marR="0" indent="0" algn="l" defTabSz="1217613" rtl="0" eaLnBrk="1" fontAlgn="base" latinLnBrk="0" hangingPunct="1">
@@ -8490,7 +8281,7 @@
               <a:defRPr/>
             </a:pPr>
             <a:r>
-              <a:rPr lang="en-US" baseline="0" dirty="0" smtClean="0"/>
+              <a:rPr lang="en-US" baseline="0" dirty="0"/>
               <a:t>When you are done with those changes you will spend a few moments visually scanning the code to ensure that your syntax is correct. That every block you start with a 'do' has a matching 'end'. Check your node attributes for spelling issues. Each key-value pair within the hash has a comma that follows.</a:t>
             </a:r>
           </a:p>
@@ -8512,7 +8303,7 @@
               <a:tabLst/>
               <a:defRPr/>
             </a:pPr>
-            <a:endParaRPr lang="en-US" baseline="0" dirty="0" smtClean="0"/>
+            <a:endParaRPr lang="en-US" baseline="0" dirty="0"/>
           </a:p>
           <a:p>
             <a:pPr marL="0" marR="0" indent="0" algn="l" defTabSz="1217613" rtl="0" eaLnBrk="1" fontAlgn="base" latinLnBrk="0" hangingPunct="1">
@@ -8533,7 +8324,7 @@
               <a:defRPr/>
             </a:pPr>
             <a:r>
-              <a:rPr lang="en-US" baseline="0" dirty="0" smtClean="0"/>
+              <a:rPr lang="en-US" baseline="0" dirty="0"/>
               <a:t>After enough examination we feel comfortable to upload the cookbook to the Chef Server.</a:t>
             </a:r>
           </a:p>
@@ -8558,10 +8349,9 @@
               <a:defRPr/>
             </a:pPr>
             <a:r>
-              <a:rPr lang="en-US" smtClean="0"/>
+              <a:rPr lang="en-US"/>
               <a:t>Chef Intermediate</a:t>
             </a:r>
-            <a:endParaRPr lang="en-US"/>
           </a:p>
         </p:txBody>
       </p:sp>
@@ -8584,7 +8374,7 @@
               <a:defRPr/>
             </a:pPr>
             <a:r>
-              <a:rPr lang="en-US" smtClean="0"/>
+              <a:rPr lang="en-US"/>
               <a:t>Chef Software, Inc.</a:t>
             </a:r>
             <a:endParaRPr lang="en-US" dirty="0"/>
@@ -8666,7 +8456,7 @@
               <a:defRPr/>
             </a:pPr>
             <a:r>
-              <a:rPr lang="en-US" baseline="0" dirty="0" smtClean="0"/>
+              <a:rPr lang="en-US" baseline="0" dirty="0"/>
               <a:t>You login to a test node that you patiently bootstrap into a union environment. This is an environment we setup with no cookbook restrictions allowing chef-client to synchronize and apply the latest changes in the recently completed cookbook. Here you see if you got the right package names, spelled all our cookbook attributes correctly, and didn't typo any of the configuration in the templates. If everything converges without error you poke around the system -- running a few commands to see if ports are blocked, services are running, and the logs don't show any errors. Logging out of the working system you feel pretty comfortable promoting the cookbook to the rehearsal environment.</a:t>
             </a:r>
           </a:p>
@@ -8691,10 +8481,9 @@
               <a:defRPr/>
             </a:pPr>
             <a:r>
-              <a:rPr lang="en-US" smtClean="0"/>
+              <a:rPr lang="en-US"/>
               <a:t>Chef Intermediate</a:t>
             </a:r>
-            <a:endParaRPr lang="en-US"/>
           </a:p>
         </p:txBody>
       </p:sp>
@@ -8717,7 +8506,7 @@
               <a:defRPr/>
             </a:pPr>
             <a:r>
-              <a:rPr lang="en-US" smtClean="0"/>
+              <a:rPr lang="en-US"/>
               <a:t>Chef Software, Inc.</a:t>
             </a:r>
             <a:endParaRPr lang="en-US" dirty="0"/>
@@ -8799,7 +8588,7 @@
               <a:defRPr/>
             </a:pPr>
             <a:r>
-              <a:rPr lang="en-US" baseline="0" dirty="0" smtClean="0"/>
+              <a:rPr lang="en-US" baseline="0" dirty="0"/>
               <a:t>Here in this new environment you may log into another system. Manually perform a chef-client run and then poke around again if everything works. You also may not. It was such a small change and everything worked on the other machine -- so it's likely to work here. Right? Instead of running through a series of ad-hoc verifications again on a new system in this environment - you start to think of the backlog of things that need to get done.</a:t>
             </a:r>
           </a:p>
@@ -8824,10 +8613,9 @@
               <a:defRPr/>
             </a:pPr>
             <a:r>
-              <a:rPr lang="en-US" smtClean="0"/>
+              <a:rPr lang="en-US"/>
               <a:t>Chef Intermediate</a:t>
             </a:r>
-            <a:endParaRPr lang="en-US"/>
           </a:p>
         </p:txBody>
       </p:sp>
@@ -8850,7 +8638,7 @@
               <a:defRPr/>
             </a:pPr>
             <a:r>
-              <a:rPr lang="en-US" smtClean="0"/>
+              <a:rPr lang="en-US"/>
               <a:t>Chef Software, Inc.</a:t>
             </a:r>
             <a:endParaRPr lang="en-US" dirty="0"/>
@@ -8915,20 +8703,20 @@
           <a:lstStyle/>
           <a:p>
             <a:r>
-              <a:rPr lang="en-US" dirty="0" smtClean="0"/>
+              <a:rPr lang="en-US" dirty="0"/>
               <a:t>Every time we make changes to our cookbooks we are introducing risk. Ideall</a:t>
             </a:r>
             <a:r>
-              <a:rPr lang="en-US" baseline="0" dirty="0" smtClean="0"/>
+              <a:rPr lang="en-US" baseline="0" dirty="0"/>
               <a:t>y we would validate every change to the cookbook but often do not because the amount of time it takes is far too prohibitive. Instead we often will batch up these changes into a set that we will validate. A set of changes like this can often hide errors that we may have introduced. This is definitely true as the complexity of the cookbook code increases.</a:t>
             </a:r>
           </a:p>
           <a:p>
-            <a:endParaRPr lang="en-US" baseline="0" dirty="0" smtClean="0"/>
-          </a:p>
-          <a:p>
-            <a:r>
-              <a:rPr lang="en-US" baseline="0" dirty="0" smtClean="0"/>
+            <a:endParaRPr lang="en-US" baseline="0" dirty="0"/>
+          </a:p>
+          <a:p>
+            <a:r>
+              <a:rPr lang="en-US" baseline="0" dirty="0"/>
               <a:t>We have a choice. We can slow down; validating every change. We can also stop making changes altogether. Or we can can adopt new practices, like testing, to help us validate these changes faster; allowing us to continue to move quickly as we continue to satisfy new requirements.</a:t>
             </a:r>
             <a:endParaRPr lang="en-US" dirty="0"/>
@@ -8954,10 +8742,9 @@
               <a:defRPr/>
             </a:pPr>
             <a:r>
-              <a:rPr lang="en-US" smtClean="0"/>
+              <a:rPr lang="en-US"/>
               <a:t>Chef Intermediate</a:t>
             </a:r>
-            <a:endParaRPr lang="en-US"/>
           </a:p>
         </p:txBody>
       </p:sp>
@@ -8980,7 +8767,7 @@
               <a:defRPr/>
             </a:pPr>
             <a:r>
-              <a:rPr lang="en-US" smtClean="0"/>
+              <a:rPr lang="en-US"/>
               <a:t>Chef Software, Inc.</a:t>
             </a:r>
             <a:endParaRPr lang="en-US" dirty="0"/>
@@ -9045,35 +8832,35 @@
           <a:lstStyle/>
           <a:p>
             <a:r>
-              <a:rPr lang="en-US" baseline="0" dirty="0" smtClean="0"/>
+              <a:rPr lang="en-US" baseline="0" dirty="0"/>
               <a:t>Carrying out testing at every stage (e.g. union, rehearsal) </a:t>
             </a:r>
             <a:r>
-              <a:rPr lang="en-US" dirty="0" smtClean="0"/>
+              <a:rPr lang="en-US" dirty="0"/>
               <a:t>gives great feedback on</a:t>
             </a:r>
             <a:r>
-              <a:rPr lang="en-US" baseline="0" dirty="0" smtClean="0"/>
+              <a:rPr lang="en-US" baseline="0" dirty="0"/>
               <a:t> its </a:t>
             </a:r>
             <a:r>
-              <a:rPr lang="en-US" dirty="0" smtClean="0"/>
+              <a:rPr lang="en-US" dirty="0"/>
               <a:t>success at the cost of the time required for each cookbook to be pushed through this workflow.</a:t>
             </a:r>
           </a:p>
           <a:p>
-            <a:endParaRPr lang="en-US" dirty="0" smtClean="0"/>
-          </a:p>
-          <a:p>
-            <a:r>
-              <a:rPr lang="en-US" dirty="0" smtClean="0"/>
+            <a:endParaRPr lang="en-US" dirty="0"/>
+          </a:p>
+          <a:p>
+            <a:r>
+              <a:rPr lang="en-US" dirty="0"/>
               <a:t>Every </a:t>
             </a:r>
             <a:r>
-              <a:rPr lang="en-US" baseline="0" dirty="0" smtClean="0"/>
+              <a:rPr lang="en-US" baseline="0" dirty="0"/>
               <a:t>change needs to be verified in this manner because Ruby, the language Chef is built on, is a dynamically typed programming language. Dynamically typed languages do checking at run-time as opposed to compile-time. This means that ruby files in our cookbook are not executed, thus not validated, until they are run. We also have the problem that we may even write the Ruby correctly but fail to understand the state of the host Operating System (OS) we are attempting to deploy against.</a:t>
             </a:r>
-            <a:endParaRPr lang="en-US" dirty="0" smtClean="0"/>
+            <a:endParaRPr lang="en-US" dirty="0"/>
           </a:p>
         </p:txBody>
       </p:sp>
@@ -9096,10 +8883,9 @@
               <a:defRPr/>
             </a:pPr>
             <a:r>
-              <a:rPr lang="en-US" smtClean="0"/>
+              <a:rPr lang="en-US"/>
               <a:t>Chef Intermediate</a:t>
             </a:r>
-            <a:endParaRPr lang="en-US"/>
           </a:p>
         </p:txBody>
       </p:sp>
@@ -9122,7 +8908,7 @@
               <a:defRPr/>
             </a:pPr>
             <a:r>
-              <a:rPr lang="en-US" smtClean="0"/>
+              <a:rPr lang="en-US"/>
               <a:t>Chef Software, Inc.</a:t>
             </a:r>
             <a:endParaRPr lang="en-US" dirty="0"/>
@@ -9206,11 +8992,11 @@
               <a:defRPr/>
             </a:pPr>
             <a:r>
-              <a:rPr lang="en-US" dirty="0" smtClean="0"/>
+              <a:rPr lang="en-US" dirty="0"/>
               <a:t>Writing</a:t>
             </a:r>
             <a:r>
-              <a:rPr lang="en-US" baseline="0" dirty="0" smtClean="0"/>
+              <a:rPr lang="en-US" baseline="0" dirty="0"/>
               <a:t> and executing tests decreases the amount of time spent between when you make a change to when you can verify that chance. This reduces the risk within the system.</a:t>
             </a:r>
           </a:p>
@@ -9232,7 +9018,7 @@
               <a:tabLst/>
               <a:defRPr/>
             </a:pPr>
-            <a:endParaRPr lang="en-US" baseline="0" dirty="0" smtClean="0"/>
+            <a:endParaRPr lang="en-US" baseline="0" dirty="0"/>
           </a:p>
           <a:p>
             <a:pPr marL="0" marR="0" indent="0" algn="l" defTabSz="1217613" rtl="0" eaLnBrk="1" fontAlgn="base" latinLnBrk="0" hangingPunct="1">
@@ -9253,39 +9039,39 @@
               <a:defRPr/>
             </a:pPr>
             <a:r>
-              <a:rPr lang="en-US" smtClean="0"/>
+              <a:rPr lang="en-US"/>
               <a:t>How testing</a:t>
             </a:r>
             <a:r>
-              <a:rPr lang="en-US" baseline="0" smtClean="0"/>
+              <a:rPr lang="en-US" baseline="0"/>
               <a:t> does </a:t>
             </a:r>
             <a:r>
-              <a:rPr lang="en-US" smtClean="0"/>
+              <a:rPr lang="en-US"/>
               <a:t>address</a:t>
             </a:r>
             <a:r>
-              <a:rPr lang="en-US" baseline="0" smtClean="0"/>
+              <a:rPr lang="en-US" baseline="0"/>
               <a:t> </a:t>
             </a:r>
             <a:r>
-              <a:rPr lang="en-US" smtClean="0"/>
+              <a:rPr lang="en-US"/>
               <a:t>the </a:t>
             </a:r>
             <a:r>
-              <a:rPr lang="en-US" dirty="0" smtClean="0"/>
+              <a:rPr lang="en-US" dirty="0"/>
               <a:t>speed of execution is </a:t>
             </a:r>
             <a:r>
-              <a:rPr lang="en-US" baseline="0" dirty="0" smtClean="0"/>
+              <a:rPr lang="en-US" baseline="0" dirty="0"/>
               <a:t>by removing many of the outside dependencies and allowing you to execute your recipes against in-memory representations of the environment. Or </a:t>
             </a:r>
             <a:r>
-              <a:rPr lang="en-US" dirty="0" smtClean="0"/>
+              <a:rPr lang="en-US" dirty="0"/>
               <a:t>automating</a:t>
             </a:r>
             <a:r>
-              <a:rPr lang="en-US" baseline="0" dirty="0" smtClean="0"/>
+              <a:rPr lang="en-US" baseline="0" dirty="0"/>
               <a:t> the management of virtual machines and the process of executing your recipes against those virtual machines. And second, by allowing you to capture and automate the work that was previously performed in ad hoc verification. </a:t>
             </a:r>
           </a:p>
@@ -9310,10 +9096,9 @@
               <a:defRPr/>
             </a:pPr>
             <a:r>
-              <a:rPr lang="en-US" smtClean="0"/>
+              <a:rPr lang="en-US"/>
               <a:t>Chef Intermediate</a:t>
             </a:r>
-            <a:endParaRPr lang="en-US"/>
           </a:p>
         </p:txBody>
       </p:sp>
@@ -9336,7 +9121,7 @@
               <a:defRPr/>
             </a:pPr>
             <a:r>
-              <a:rPr lang="en-US" smtClean="0"/>
+              <a:rPr lang="en-US"/>
               <a:t>Chef Software, Inc.</a:t>
             </a:r>
             <a:endParaRPr lang="en-US" dirty="0"/>
@@ -9418,11 +9203,11 @@
               <a:defRPr/>
             </a:pPr>
             <a:r>
-              <a:rPr lang="en-US" dirty="0" smtClean="0"/>
+              <a:rPr lang="en-US" dirty="0"/>
               <a:t>I shared with you my opinion on why</a:t>
             </a:r>
             <a:r>
-              <a:rPr lang="en-US" baseline="0" dirty="0" smtClean="0"/>
+              <a:rPr lang="en-US" baseline="0" dirty="0"/>
               <a:t> I think it is important to write tests. Now I would like to understand what reasons you see for writing tests. I would also like to know your reasons for not writing tests.</a:t>
             </a:r>
           </a:p>
@@ -9444,11 +9229,11 @@
               <a:tabLst/>
               <a:defRPr/>
             </a:pPr>
-            <a:endParaRPr lang="en-US" baseline="0" dirty="0" smtClean="0"/>
-          </a:p>
-          <a:p>
-            <a:r>
-              <a:rPr lang="en-US" baseline="0" dirty="0" smtClean="0"/>
+            <a:endParaRPr lang="en-US" baseline="0" dirty="0"/>
+          </a:p>
+          <a:p>
+            <a:r>
+              <a:rPr lang="en-US" baseline="0" dirty="0"/>
               <a:t>Instructor Note: With large groups I often find it better to have individuals turn to the individuals around them, form groups of whatever size they feel comfortable, and have them take turns asking and answering the questions. When all the groups are done I then open the discussion up to the entire group allowing each group or individuals to share their answers.</a:t>
             </a:r>
             <a:endParaRPr lang="en-US" dirty="0"/>
@@ -9474,10 +9259,9 @@
               <a:defRPr/>
             </a:pPr>
             <a:r>
-              <a:rPr lang="en-US" smtClean="0"/>
+              <a:rPr lang="en-US"/>
               <a:t>Chef Intermediate</a:t>
             </a:r>
-            <a:endParaRPr lang="en-US"/>
           </a:p>
         </p:txBody>
       </p:sp>
@@ -9500,7 +9284,7 @@
               <a:defRPr/>
             </a:pPr>
             <a:r>
-              <a:rPr lang="en-US" smtClean="0"/>
+              <a:rPr lang="en-US"/>
               <a:t>Chef Software, Inc.</a:t>
             </a:r>
             <a:endParaRPr lang="en-US" dirty="0"/>
@@ -9583,7 +9367,7 @@
           </a:lstStyle>
           <a:p>
             <a:r>
-              <a:rPr lang="en-US" smtClean="0"/>
+              <a:rPr lang="en-US"/>
               <a:t>Click to edit Master title style</a:t>
             </a:r>
             <a:endParaRPr lang="en-US" dirty="0"/>
@@ -9641,7 +9425,7 @@
           <a:p>
             <a:pPr lvl="0"/>
             <a:r>
-              <a:rPr lang="en-US" smtClean="0"/>
+              <a:rPr lang="en-US"/>
               <a:t>Click to edit Master text styles</a:t>
             </a:r>
           </a:p>
@@ -9660,13 +9444,6 @@
   <p:transition spd="med">
     <p:fade/>
   </p:transition>
-  <p:timing>
-    <p:tnLst>
-      <p:par>
-        <p:cTn id="1" dur="indefinite" restart="never" nodeType="tmRoot"/>
-      </p:par>
-    </p:tnLst>
-  </p:timing>
 </p:sldLayout>
 </file>
 
@@ -9730,7 +9507,7 @@
           </a:lstStyle>
           <a:p>
             <a:r>
-              <a:rPr lang="en-US" smtClean="0"/>
+              <a:rPr lang="en-US"/>
               <a:t>Click to edit Master title style</a:t>
             </a:r>
             <a:endParaRPr lang="en-US" dirty="0"/>
@@ -9788,7 +9565,7 @@
           <a:p>
             <a:pPr lvl="0"/>
             <a:r>
-              <a:rPr lang="en-US" dirty="0" smtClean="0"/>
+              <a:rPr lang="en-US" dirty="0"/>
               <a:t>source code</a:t>
             </a:r>
           </a:p>
@@ -9834,28 +9611,28 @@
           <a:p>
             <a:pPr lvl="0"/>
             <a:r>
-              <a:rPr lang="en-US" smtClean="0"/>
+              <a:rPr lang="en-US"/>
               <a:t>Click to edit Master text styles</a:t>
             </a:r>
           </a:p>
           <a:p>
             <a:pPr lvl="1"/>
             <a:r>
-              <a:rPr lang="en-US" smtClean="0"/>
+              <a:rPr lang="en-US"/>
               <a:t>Second level</a:t>
             </a:r>
           </a:p>
           <a:p>
             <a:pPr lvl="2"/>
             <a:r>
-              <a:rPr lang="en-US" smtClean="0"/>
+              <a:rPr lang="en-US"/>
               <a:t>Third level</a:t>
             </a:r>
           </a:p>
           <a:p>
             <a:pPr lvl="3"/>
             <a:r>
-              <a:rPr lang="en-US" smtClean="0"/>
+              <a:rPr lang="en-US"/>
               <a:t>Fourth level</a:t>
             </a:r>
           </a:p>
@@ -9899,7 +9676,7 @@
           <a:p>
             <a:pPr lvl="0"/>
             <a:r>
-              <a:rPr lang="en-US" dirty="0" smtClean="0"/>
+              <a:rPr lang="en-US" dirty="0"/>
               <a:t>-</a:t>
             </a:r>
           </a:p>
@@ -9943,7 +9720,7 @@
           <a:p>
             <a:pPr lvl="0"/>
             <a:r>
-              <a:rPr lang="en-US" dirty="0" smtClean="0"/>
+              <a:rPr lang="en-US" dirty="0"/>
               <a:t>+</a:t>
             </a:r>
           </a:p>
@@ -9962,13 +9739,6 @@
   <p:transition spd="med">
     <p:fade/>
   </p:transition>
-  <p:timing>
-    <p:tnLst>
-      <p:par>
-        <p:cTn id="1" dur="indefinite" restart="never" nodeType="tmRoot"/>
-      </p:par>
-    </p:tnLst>
-  </p:timing>
 </p:sldLayout>
 </file>
 
@@ -10099,14 +9869,14 @@
           </a:ln>
           <a:extLst>
             <a:ext uri="{909E8E84-426E-40dd-AFC4-6F175D3DCCD1}">
-              <a14:hiddenFill xmlns="" xmlns:a14="http://schemas.microsoft.com/office/drawing/2010/main">
+              <a14:hiddenFill xmlns:a14="http://schemas.microsoft.com/office/drawing/2010/main" xmlns="">
                 <a:solidFill>
                   <a:srgbClr val="FFFFFF"/>
                 </a:solidFill>
               </a14:hiddenFill>
             </a:ext>
             <a:ext uri="{91240B29-F687-4f45-9708-019B960494DF}">
-              <a14:hiddenLine xmlns="" xmlns:a14="http://schemas.microsoft.com/office/drawing/2010/main" w="9525">
+              <a14:hiddenLine xmlns:a14="http://schemas.microsoft.com/office/drawing/2010/main" xmlns="" w="9525">
                 <a:solidFill>
                   <a:srgbClr val="000000"/>
                 </a:solidFill>
@@ -10254,14 +10024,14 @@
           </a:ln>
           <a:extLst>
             <a:ext uri="{909E8E84-426E-40dd-AFC4-6F175D3DCCD1}">
-              <a14:hiddenFill xmlns="" xmlns:a14="http://schemas.microsoft.com/office/drawing/2010/main">
+              <a14:hiddenFill xmlns:a14="http://schemas.microsoft.com/office/drawing/2010/main" xmlns="">
                 <a:solidFill>
                   <a:srgbClr val="FFFFFF"/>
                 </a:solidFill>
               </a14:hiddenFill>
             </a:ext>
             <a:ext uri="{91240B29-F687-4f45-9708-019B960494DF}">
-              <a14:hiddenLine xmlns="" xmlns:a14="http://schemas.microsoft.com/office/drawing/2010/main" w="9525">
+              <a14:hiddenLine xmlns:a14="http://schemas.microsoft.com/office/drawing/2010/main" xmlns="" w="9525">
                 <a:solidFill>
                   <a:srgbClr val="000000"/>
                 </a:solidFill>
@@ -10489,21 +10259,21 @@
           <a:p>
             <a:pPr lvl="0"/>
             <a:r>
-              <a:rPr lang="en-US" smtClean="0"/>
+              <a:rPr lang="en-US"/>
               <a:t>Click to edit Master text styles</a:t>
             </a:r>
           </a:p>
           <a:p>
             <a:pPr lvl="1"/>
             <a:r>
-              <a:rPr lang="en-US" smtClean="0"/>
+              <a:rPr lang="en-US"/>
               <a:t>Second level</a:t>
             </a:r>
           </a:p>
           <a:p>
             <a:pPr lvl="2"/>
             <a:r>
-              <a:rPr lang="en-US" smtClean="0"/>
+              <a:rPr lang="en-US"/>
               <a:t>Third level</a:t>
             </a:r>
           </a:p>
@@ -10549,21 +10319,21 @@
           <a:p>
             <a:pPr lvl="0"/>
             <a:r>
-              <a:rPr lang="en-US" smtClean="0"/>
+              <a:rPr lang="en-US"/>
               <a:t>Click to edit Master text styles</a:t>
             </a:r>
           </a:p>
           <a:p>
             <a:pPr lvl="1"/>
             <a:r>
-              <a:rPr lang="en-US" smtClean="0"/>
+              <a:rPr lang="en-US"/>
               <a:t>Second level</a:t>
             </a:r>
           </a:p>
           <a:p>
             <a:pPr lvl="2"/>
             <a:r>
-              <a:rPr lang="en-US" smtClean="0"/>
+              <a:rPr lang="en-US"/>
               <a:t>Third level</a:t>
             </a:r>
           </a:p>
@@ -10603,7 +10373,7 @@
           <a:p>
             <a:pPr lvl="0"/>
             <a:r>
-              <a:rPr lang="en-US" dirty="0" smtClean="0"/>
+              <a:rPr lang="en-US" dirty="0"/>
               <a:t>A</a:t>
             </a:r>
           </a:p>
@@ -10643,7 +10413,7 @@
           <a:p>
             <a:pPr lvl="0"/>
             <a:r>
-              <a:rPr lang="en-US" dirty="0" smtClean="0"/>
+              <a:rPr lang="en-US" dirty="0"/>
               <a:t>B</a:t>
             </a:r>
           </a:p>
@@ -10662,13 +10432,6 @@
   <p:transition spd="med">
     <p:fade/>
   </p:transition>
-  <p:timing>
-    <p:tnLst>
-      <p:par>
-        <p:cTn id="1" dur="indefinite" restart="never" nodeType="tmRoot"/>
-      </p:par>
-    </p:tnLst>
-  </p:timing>
 </p:sldLayout>
 </file>
 
@@ -10759,14 +10522,14 @@
           </a:ln>
           <a:extLst>
             <a:ext uri="{909E8E84-426E-40dd-AFC4-6F175D3DCCD1}">
-              <a14:hiddenFill xmlns="" xmlns:a14="http://schemas.microsoft.com/office/drawing/2010/main">
+              <a14:hiddenFill xmlns:a14="http://schemas.microsoft.com/office/drawing/2010/main" xmlns="">
                 <a:solidFill>
                   <a:srgbClr val="FFFFFF"/>
                 </a:solidFill>
               </a14:hiddenFill>
             </a:ext>
             <a:ext uri="{91240B29-F687-4f45-9708-019B960494DF}">
-              <a14:hiddenLine xmlns="" xmlns:a14="http://schemas.microsoft.com/office/drawing/2010/main" w="9525">
+              <a14:hiddenLine xmlns:a14="http://schemas.microsoft.com/office/drawing/2010/main" xmlns="" w="9525">
                 <a:solidFill>
                   <a:srgbClr val="000000"/>
                 </a:solidFill>
@@ -10791,13 +10554,6 @@
   <p:transition spd="med">
     <p:fade/>
   </p:transition>
-  <p:timing>
-    <p:tnLst>
-      <p:par>
-        <p:cTn id="1" dur="indefinite" restart="never" nodeType="tmRoot"/>
-      </p:par>
-    </p:tnLst>
-  </p:timing>
 </p:sldLayout>
 </file>
 
@@ -10936,10 +10692,9 @@
           </a:lstStyle>
           <a:p>
             <a:r>
-              <a:rPr lang="en-US" dirty="0" smtClean="0"/>
+              <a:rPr lang="en-US" dirty="0"/>
               <a:t>Motivation</a:t>
             </a:r>
-            <a:endParaRPr lang="en-US" dirty="0"/>
           </a:p>
         </p:txBody>
       </p:sp>
@@ -11066,7 +10821,7 @@
           </a:lstStyle>
           <a:p>
             <a:r>
-              <a:rPr lang="en-US" dirty="0" smtClean="0"/>
+              <a:rPr lang="en-US" dirty="0"/>
               <a:t>Click to edit Master subtitle style</a:t>
             </a:r>
           </a:p>
@@ -11085,13 +10840,6 @@
   <p:transition spd="med">
     <p:fade/>
   </p:transition>
-  <p:timing>
-    <p:tnLst>
-      <p:par>
-        <p:cTn id="1" dur="indefinite" restart="never" nodeType="tmRoot"/>
-      </p:par>
-    </p:tnLst>
-  </p:timing>
 </p:sldLayout>
 </file>
 
@@ -11230,10 +10978,9 @@
           </a:lstStyle>
           <a:p>
             <a:r>
-              <a:rPr lang="en-US" dirty="0" smtClean="0"/>
+              <a:rPr lang="en-US" dirty="0"/>
               <a:t>Problem</a:t>
             </a:r>
-            <a:endParaRPr lang="en-US" dirty="0"/>
           </a:p>
         </p:txBody>
       </p:sp>
@@ -11360,7 +11107,7 @@
           </a:lstStyle>
           <a:p>
             <a:r>
-              <a:rPr lang="en-US" dirty="0" smtClean="0"/>
+              <a:rPr lang="en-US" dirty="0"/>
               <a:t>Click to edit Master subtitle style</a:t>
             </a:r>
           </a:p>
@@ -11379,13 +11126,6 @@
   <p:transition spd="med">
     <p:fade/>
   </p:transition>
-  <p:timing>
-    <p:tnLst>
-      <p:par>
-        <p:cTn id="1" dur="indefinite" restart="never" nodeType="tmRoot"/>
-      </p:par>
-    </p:tnLst>
-  </p:timing>
 </p:sldLayout>
 </file>
 
@@ -11440,7 +11180,7 @@
               <a:defRPr/>
             </a:pPr>
             <a:r>
-              <a:rPr lang="en-US" sz="16933" dirty="0" smtClean="0">
+              <a:rPr lang="en-US" sz="16933" dirty="0">
                 <a:ln w="18415" cmpd="sng">
                   <a:solidFill>
                     <a:srgbClr val="FFFFFF"/>
@@ -11459,23 +11199,6 @@
               </a:rPr>
               <a:t>REFERENCE</a:t>
             </a:r>
-            <a:endParaRPr lang="en-US" sz="16933" dirty="0">
-              <a:ln w="18415" cmpd="sng">
-                <a:solidFill>
-                  <a:srgbClr val="FFFFFF"/>
-                </a:solidFill>
-                <a:prstDash val="solid"/>
-              </a:ln>
-              <a:solidFill>
-                <a:schemeClr val="bg2">
-                  <a:lumMod val="95000"/>
-                  <a:alpha val="50000"/>
-                </a:schemeClr>
-              </a:solidFill>
-              <a:latin typeface="+mn-lt"/>
-              <a:ea typeface="+mn-ea"/>
-              <a:cs typeface="+mn-cs"/>
-            </a:endParaRPr>
           </a:p>
         </p:txBody>
       </p:sp>
@@ -11541,10 +11264,9 @@
           </a:lstStyle>
           <a:p>
             <a:r>
-              <a:rPr lang="en-US" dirty="0" smtClean="0"/>
+              <a:rPr lang="en-US" dirty="0"/>
               <a:t>Documentation</a:t>
             </a:r>
-            <a:endParaRPr lang="en-US" dirty="0"/>
           </a:p>
         </p:txBody>
       </p:sp>
@@ -11671,7 +11393,7 @@
           </a:lstStyle>
           <a:p>
             <a:r>
-              <a:rPr lang="en-US" dirty="0" smtClean="0"/>
+              <a:rPr lang="en-US" dirty="0"/>
               <a:t>Click to edit Master subtitle style</a:t>
             </a:r>
           </a:p>
@@ -11711,14 +11433,14 @@
           <a:p>
             <a:pPr lvl="0"/>
             <a:r>
-              <a:rPr lang="en-US" dirty="0" smtClean="0"/>
+              <a:rPr lang="en-US" dirty="0"/>
               <a:t>http://</a:t>
             </a:r>
             <a:r>
-              <a:rPr lang="en-US" dirty="0" err="1" smtClean="0"/>
+              <a:rPr lang="en-US" dirty="0" err="1"/>
               <a:t>docs.chef.io</a:t>
             </a:r>
-            <a:endParaRPr lang="en-US" dirty="0" smtClean="0"/>
+            <a:endParaRPr lang="en-US" dirty="0"/>
           </a:p>
         </p:txBody>
       </p:sp>
@@ -11735,13 +11457,6 @@
   <p:transition spd="med">
     <p:fade/>
   </p:transition>
-  <p:timing>
-    <p:tnLst>
-      <p:par>
-        <p:cTn id="1" dur="indefinite" restart="never" nodeType="tmRoot"/>
-      </p:par>
-    </p:tnLst>
-  </p:timing>
 </p:sldLayout>
 </file>
 
@@ -11880,10 +11595,9 @@
           </a:lstStyle>
           <a:p>
             <a:r>
-              <a:rPr lang="en-US" dirty="0" smtClean="0"/>
+              <a:rPr lang="en-US" dirty="0"/>
               <a:t>Concept</a:t>
             </a:r>
-            <a:endParaRPr lang="en-US" dirty="0"/>
           </a:p>
         </p:txBody>
       </p:sp>
@@ -12010,7 +11724,7 @@
           </a:lstStyle>
           <a:p>
             <a:r>
-              <a:rPr lang="en-US" dirty="0" smtClean="0"/>
+              <a:rPr lang="en-US" dirty="0"/>
               <a:t>Click to edit Master subtitle style</a:t>
             </a:r>
           </a:p>
@@ -12029,13 +11743,6 @@
   <p:transition spd="med">
     <p:fade/>
   </p:transition>
-  <p:timing>
-    <p:tnLst>
-      <p:par>
-        <p:cTn id="1" dur="indefinite" restart="never" nodeType="tmRoot"/>
-      </p:par>
-    </p:tnLst>
-  </p:timing>
 </p:sldLayout>
 </file>
 
@@ -12174,10 +11881,9 @@
           </a:lstStyle>
           <a:p>
             <a:r>
-              <a:rPr lang="en-US" dirty="0" smtClean="0"/>
+              <a:rPr lang="en-US" dirty="0"/>
               <a:t>Group Exercise</a:t>
             </a:r>
-            <a:endParaRPr lang="en-US" dirty="0"/>
           </a:p>
         </p:txBody>
       </p:sp>
@@ -12222,7 +11928,7 @@
           <a:p>
             <a:pPr lvl="0"/>
             <a:r>
-              <a:rPr lang="en-US" dirty="0" smtClean="0"/>
+              <a:rPr lang="en-US" dirty="0"/>
               <a:t>Click to edit Master text styles</a:t>
             </a:r>
           </a:p>
@@ -12250,14 +11956,14 @@
           </a:ln>
           <a:extLst>
             <a:ext uri="{909E8E84-426E-40dd-AFC4-6F175D3DCCD1}">
-              <a14:hiddenFill xmlns="" xmlns:a14="http://schemas.microsoft.com/office/drawing/2010/main">
+              <a14:hiddenFill xmlns:a14="http://schemas.microsoft.com/office/drawing/2010/main" xmlns="">
                 <a:solidFill>
                   <a:srgbClr val="FFFFFF"/>
                 </a:solidFill>
               </a14:hiddenFill>
             </a:ext>
             <a:ext uri="{91240B29-F687-4f45-9708-019B960494DF}">
-              <a14:hiddenLine xmlns="" xmlns:a14="http://schemas.microsoft.com/office/drawing/2010/main" w="9525">
+              <a14:hiddenLine xmlns:a14="http://schemas.microsoft.com/office/drawing/2010/main" xmlns="" w="9525">
                 <a:solidFill>
                   <a:srgbClr val="000000"/>
                 </a:solidFill>
@@ -12417,28 +12123,28 @@
           <a:p>
             <a:pPr lvl="0"/>
             <a:r>
-              <a:rPr lang="en-US" dirty="0" smtClean="0"/>
+              <a:rPr lang="en-US" dirty="0"/>
               <a:t>Click to edit Master text styles</a:t>
             </a:r>
           </a:p>
           <a:p>
             <a:pPr lvl="1"/>
             <a:r>
-              <a:rPr lang="en-US" dirty="0" smtClean="0"/>
+              <a:rPr lang="en-US" dirty="0"/>
               <a:t>Second level</a:t>
             </a:r>
           </a:p>
           <a:p>
             <a:pPr lvl="2"/>
             <a:r>
-              <a:rPr lang="en-US" dirty="0" smtClean="0"/>
+              <a:rPr lang="en-US" dirty="0"/>
               <a:t>Third level</a:t>
             </a:r>
           </a:p>
           <a:p>
             <a:pPr lvl="3"/>
             <a:r>
-              <a:rPr lang="en-US" dirty="0" smtClean="0"/>
+              <a:rPr lang="en-US" dirty="0"/>
               <a:t>Fourth level</a:t>
             </a:r>
           </a:p>
@@ -12457,13 +12163,6 @@
   <p:transition spd="med">
     <p:fade/>
   </p:transition>
-  <p:timing>
-    <p:tnLst>
-      <p:par>
-        <p:cTn id="1" dur="indefinite" restart="never" nodeType="tmRoot"/>
-      </p:par>
-    </p:tnLst>
-  </p:timing>
 </p:sldLayout>
 </file>
 
@@ -12602,10 +12301,9 @@
           </a:lstStyle>
           <a:p>
             <a:r>
-              <a:rPr lang="en-US" dirty="0" smtClean="0"/>
+              <a:rPr lang="en-US" dirty="0"/>
               <a:t>Lab</a:t>
             </a:r>
-            <a:endParaRPr lang="en-US" dirty="0"/>
           </a:p>
         </p:txBody>
       </p:sp>
@@ -12733,7 +12431,7 @@
           </a:lstStyle>
           <a:p>
             <a:r>
-              <a:rPr lang="en-US" dirty="0" smtClean="0"/>
+              <a:rPr lang="en-US" dirty="0"/>
               <a:t>Click to edit Master subtitle style</a:t>
             </a:r>
           </a:p>
@@ -12752,13 +12450,6 @@
   <p:transition spd="med">
     <p:fade/>
   </p:transition>
-  <p:timing>
-    <p:tnLst>
-      <p:par>
-        <p:cTn id="1" dur="indefinite" restart="never" nodeType="tmRoot"/>
-      </p:par>
-    </p:tnLst>
-  </p:timing>
 </p:sldLayout>
 </file>
 
@@ -12897,10 +12588,9 @@
           </a:lstStyle>
           <a:p>
             <a:r>
-              <a:rPr lang="en-US" dirty="0" smtClean="0"/>
+              <a:rPr lang="en-US" dirty="0"/>
               <a:t>Commit</a:t>
             </a:r>
-            <a:endParaRPr lang="en-US" dirty="0"/>
           </a:p>
         </p:txBody>
       </p:sp>
@@ -13029,30 +12719,30 @@
           </a:lstStyle>
           <a:p>
             <a:r>
-              <a:rPr lang="en-US" dirty="0" smtClean="0"/>
+              <a:rPr lang="en-US" dirty="0"/>
               <a:t>$ cd repo</a:t>
             </a:r>
           </a:p>
           <a:p>
             <a:r>
-              <a:rPr lang="en-US" dirty="0" smtClean="0"/>
+              <a:rPr lang="en-US" dirty="0"/>
               <a:t>$ git </a:t>
             </a:r>
             <a:r>
-              <a:rPr lang="en-US" dirty="0" err="1" smtClean="0"/>
+              <a:rPr lang="en-US" dirty="0" err="1"/>
               <a:t>init</a:t>
             </a:r>
-            <a:endParaRPr lang="en-US" dirty="0" smtClean="0"/>
-          </a:p>
-          <a:p>
-            <a:r>
-              <a:rPr lang="en-US" dirty="0" smtClean="0"/>
+            <a:endParaRPr lang="en-US" dirty="0"/>
+          </a:p>
+          <a:p>
+            <a:r>
+              <a:rPr lang="en-US" dirty="0"/>
               <a:t>$ git add .</a:t>
             </a:r>
           </a:p>
           <a:p>
             <a:r>
-              <a:rPr lang="en-US" dirty="0" smtClean="0"/>
+              <a:rPr lang="en-US" dirty="0"/>
               <a:t>$ git commit -m "Work Complete"</a:t>
             </a:r>
           </a:p>
@@ -13071,13 +12761,6 @@
   <p:transition spd="med">
     <p:fade/>
   </p:transition>
-  <p:timing>
-    <p:tnLst>
-      <p:par>
-        <p:cTn id="1" dur="indefinite" restart="never" nodeType="tmRoot"/>
-      </p:par>
-    </p:tnLst>
-  </p:timing>
 </p:sldLayout>
 </file>
 
@@ -13130,7 +12813,7 @@
           <a:lstStyle/>
           <a:p>
             <a:r>
-              <a:rPr lang="en-US" smtClean="0"/>
+              <a:rPr lang="en-US"/>
               <a:t>Click to edit Master title style</a:t>
             </a:r>
             <a:endParaRPr lang="en-US" dirty="0"/>
@@ -13222,21 +12905,21 @@
           <a:p>
             <a:pPr lvl="0"/>
             <a:r>
-              <a:rPr lang="en-US" smtClean="0"/>
+              <a:rPr lang="en-US"/>
               <a:t>Click to edit Master text styles</a:t>
             </a:r>
           </a:p>
           <a:p>
             <a:pPr lvl="1"/>
             <a:r>
-              <a:rPr lang="en-US" smtClean="0"/>
+              <a:rPr lang="en-US"/>
               <a:t>Second level</a:t>
             </a:r>
           </a:p>
           <a:p>
             <a:pPr lvl="2"/>
             <a:r>
-              <a:rPr lang="en-US" smtClean="0"/>
+              <a:rPr lang="en-US"/>
               <a:t>Third level</a:t>
             </a:r>
           </a:p>
@@ -13255,13 +12938,6 @@
   <p:transition spd="med">
     <p:fade/>
   </p:transition>
-  <p:timing>
-    <p:tnLst>
-      <p:par>
-        <p:cTn id="1" dur="indefinite" restart="never" nodeType="tmRoot"/>
-      </p:par>
-    </p:tnLst>
-  </p:timing>
 </p:sldLayout>
 </file>
 
@@ -13316,7 +12992,7 @@
               <a:defRPr/>
             </a:pPr>
             <a:r>
-              <a:rPr lang="en-US" sz="16933" dirty="0" smtClean="0">
+              <a:rPr lang="en-US" sz="16933" dirty="0">
                 <a:ln w="18415" cmpd="sng">
                   <a:solidFill>
                     <a:srgbClr val="FFFFFF"/>
@@ -13335,23 +13011,6 @@
               </a:rPr>
               <a:t>DISCUSSION</a:t>
             </a:r>
-            <a:endParaRPr lang="en-US" sz="16933" dirty="0">
-              <a:ln w="18415" cmpd="sng">
-                <a:solidFill>
-                  <a:srgbClr val="FFFFFF"/>
-                </a:solidFill>
-                <a:prstDash val="solid"/>
-              </a:ln>
-              <a:solidFill>
-                <a:schemeClr val="bg2">
-                  <a:lumMod val="95000"/>
-                  <a:alpha val="50000"/>
-                </a:schemeClr>
-              </a:solidFill>
-              <a:latin typeface="+mn-lt"/>
-              <a:ea typeface="+mn-ea"/>
-              <a:cs typeface="+mn-cs"/>
-            </a:endParaRPr>
           </a:p>
         </p:txBody>
       </p:sp>
@@ -13417,10 +13076,9 @@
           </a:lstStyle>
           <a:p>
             <a:r>
-              <a:rPr lang="en-US" dirty="0" smtClean="0"/>
+              <a:rPr lang="en-US" dirty="0"/>
               <a:t>Discussion</a:t>
             </a:r>
-            <a:endParaRPr lang="en-US" dirty="0"/>
           </a:p>
         </p:txBody>
       </p:sp>
@@ -13547,7 +13205,7 @@
           </a:lstStyle>
           <a:p>
             <a:r>
-              <a:rPr lang="en-US" dirty="0" smtClean="0"/>
+              <a:rPr lang="en-US" dirty="0"/>
               <a:t>Questions</a:t>
             </a:r>
           </a:p>
@@ -13566,13 +13224,6 @@
   <p:transition spd="med">
     <p:fade/>
   </p:transition>
-  <p:timing>
-    <p:tnLst>
-      <p:par>
-        <p:cTn id="1" dur="indefinite" restart="never" nodeType="tmRoot"/>
-      </p:par>
-    </p:tnLst>
-  </p:timing>
 </p:sldLayout>
 </file>
 
@@ -13646,14 +13297,14 @@
           </a:ln>
           <a:extLst>
             <a:ext uri="{909E8E84-426E-40dd-AFC4-6F175D3DCCD1}">
-              <a14:hiddenFill xmlns="" xmlns:a14="http://schemas.microsoft.com/office/drawing/2010/main">
+              <a14:hiddenFill xmlns:a14="http://schemas.microsoft.com/office/drawing/2010/main" xmlns="">
                 <a:solidFill>
                   <a:srgbClr val="FFFFFF"/>
                 </a:solidFill>
               </a14:hiddenFill>
             </a:ext>
             <a:ext uri="{91240B29-F687-4f45-9708-019B960494DF}">
-              <a14:hiddenLine xmlns="" xmlns:a14="http://schemas.microsoft.com/office/drawing/2010/main" w="9525">
+              <a14:hiddenLine xmlns:a14="http://schemas.microsoft.com/office/drawing/2010/main" xmlns="" w="9525">
                 <a:solidFill>
                   <a:srgbClr val="000000"/>
                 </a:solidFill>
@@ -13785,7 +13436,7 @@
           <a:p>
             <a:pPr lvl="0"/>
             <a:r>
-              <a:rPr lang="en-US" dirty="0" smtClean="0"/>
+              <a:rPr lang="en-US" dirty="0"/>
               <a:t>RESULT</a:t>
             </a:r>
           </a:p>
@@ -13832,7 +13483,7 @@
           <a:p>
             <a:pPr lvl="0"/>
             <a:r>
-              <a:rPr lang="en-US" dirty="0" smtClean="0"/>
+              <a:rPr lang="en-US" dirty="0"/>
               <a:t>&gt; command</a:t>
             </a:r>
           </a:p>
@@ -13884,7 +13535,7 @@
           <a:p>
             <a:pPr lvl="0"/>
             <a:r>
-              <a:rPr lang="en-US" dirty="0" smtClean="0"/>
+              <a:rPr lang="en-US" dirty="0"/>
               <a:t> </a:t>
             </a:r>
           </a:p>
@@ -13912,7 +13563,7 @@
           </a:lstStyle>
           <a:p>
             <a:r>
-              <a:rPr lang="en-US" smtClean="0"/>
+              <a:rPr lang="en-US"/>
               <a:t>Click to edit Master title style</a:t>
             </a:r>
             <a:endParaRPr lang="en-US" dirty="0"/>
@@ -13932,13 +13583,6 @@
   <p:transition spd="med">
     <p:fade/>
   </p:transition>
-  <p:timing>
-    <p:tnLst>
-      <p:par>
-        <p:cTn id="1" dur="indefinite" restart="never" nodeType="tmRoot"/>
-      </p:par>
-    </p:tnLst>
-  </p:timing>
 </p:sldLayout>
 </file>
 
@@ -14002,7 +13646,7 @@
           </a:lstStyle>
           <a:p>
             <a:r>
-              <a:rPr lang="en-US" smtClean="0"/>
+              <a:rPr lang="en-US"/>
               <a:t>Click to edit Master title style</a:t>
             </a:r>
             <a:endParaRPr lang="en-US" dirty="0"/>
@@ -14066,7 +13710,7 @@
           <a:p>
             <a:pPr lvl="0"/>
             <a:r>
-              <a:rPr lang="en-US" dirty="0" smtClean="0"/>
+              <a:rPr lang="en-US" dirty="0"/>
               <a:t>command or result</a:t>
             </a:r>
           </a:p>
@@ -14112,21 +13756,21 @@
           <a:p>
             <a:pPr lvl="0"/>
             <a:r>
-              <a:rPr lang="en-US" smtClean="0"/>
+              <a:rPr lang="en-US"/>
               <a:t>Click to edit Master text styles</a:t>
             </a:r>
           </a:p>
           <a:p>
             <a:pPr lvl="1"/>
             <a:r>
-              <a:rPr lang="en-US" smtClean="0"/>
+              <a:rPr lang="en-US"/>
               <a:t>Second level</a:t>
             </a:r>
           </a:p>
           <a:p>
             <a:pPr lvl="2"/>
             <a:r>
-              <a:rPr lang="en-US" smtClean="0"/>
+              <a:rPr lang="en-US"/>
               <a:t>Third level</a:t>
             </a:r>
           </a:p>
@@ -14145,13 +13789,6 @@
   <p:transition spd="med">
     <p:fade/>
   </p:transition>
-  <p:timing>
-    <p:tnLst>
-      <p:par>
-        <p:cTn id="1" dur="indefinite" restart="never" nodeType="tmRoot"/>
-      </p:par>
-    </p:tnLst>
-  </p:timing>
 </p:sldLayout>
 </file>
 
@@ -14225,14 +13862,14 @@
           </a:ln>
           <a:extLst>
             <a:ext uri="{909E8E84-426E-40dd-AFC4-6F175D3DCCD1}">
-              <a14:hiddenFill xmlns="" xmlns:a14="http://schemas.microsoft.com/office/drawing/2010/main">
+              <a14:hiddenFill xmlns:a14="http://schemas.microsoft.com/office/drawing/2010/main" xmlns="">
                 <a:solidFill>
                   <a:srgbClr val="FFFFFF"/>
                 </a:solidFill>
               </a14:hiddenFill>
             </a:ext>
             <a:ext uri="{91240B29-F687-4f45-9708-019B960494DF}">
-              <a14:hiddenLine xmlns="" xmlns:a14="http://schemas.microsoft.com/office/drawing/2010/main" w="9525">
+              <a14:hiddenLine xmlns:a14="http://schemas.microsoft.com/office/drawing/2010/main" xmlns="" w="9525">
                 <a:solidFill>
                   <a:srgbClr val="000000"/>
                 </a:solidFill>
@@ -14304,7 +13941,7 @@
           </a:lstStyle>
           <a:p>
             <a:r>
-              <a:rPr lang="en-US" smtClean="0"/>
+              <a:rPr lang="en-US"/>
               <a:t>Click to edit Master title style</a:t>
             </a:r>
             <a:endParaRPr lang="en-US" dirty="0"/>
@@ -14398,7 +14035,7 @@
           <a:p>
             <a:pPr lvl="0"/>
             <a:r>
-              <a:rPr lang="en-US" dirty="0" smtClean="0"/>
+              <a:rPr lang="en-US" dirty="0"/>
               <a:t>RESULT</a:t>
             </a:r>
           </a:p>
@@ -14447,7 +14084,7 @@
           <a:p>
             <a:pPr lvl="0"/>
             <a:r>
-              <a:rPr lang="en-US" dirty="0" smtClean="0"/>
+              <a:rPr lang="en-US" dirty="0"/>
               <a:t>&gt; command</a:t>
             </a:r>
           </a:p>
@@ -14499,7 +14136,7 @@
           <a:p>
             <a:pPr lvl="0"/>
             <a:r>
-              <a:rPr lang="en-US" dirty="0" smtClean="0"/>
+              <a:rPr lang="en-US" dirty="0"/>
               <a:t> </a:t>
             </a:r>
           </a:p>
@@ -14518,13 +14155,6 @@
   <p:transition spd="med">
     <p:fade/>
   </p:transition>
-  <p:timing>
-    <p:tnLst>
-      <p:par>
-        <p:cTn id="1" dur="indefinite" restart="never" nodeType="tmRoot"/>
-      </p:par>
-    </p:tnLst>
-  </p:timing>
 </p:sldLayout>
 </file>
 
@@ -14588,7 +14218,7 @@
           </a:lstStyle>
           <a:p>
             <a:r>
-              <a:rPr lang="en-US" smtClean="0"/>
+              <a:rPr lang="en-US"/>
               <a:t>Click to edit Master title style</a:t>
             </a:r>
             <a:endParaRPr lang="en-US" dirty="0"/>
@@ -14654,7 +14284,7 @@
           <a:p>
             <a:pPr lvl="0"/>
             <a:r>
-              <a:rPr lang="en-US" dirty="0" smtClean="0"/>
+              <a:rPr lang="en-US" dirty="0"/>
               <a:t>command or result</a:t>
             </a:r>
           </a:p>
@@ -14700,21 +14330,21 @@
           <a:p>
             <a:pPr lvl="0"/>
             <a:r>
-              <a:rPr lang="en-US" smtClean="0"/>
+              <a:rPr lang="en-US"/>
               <a:t>Click to edit Master text styles</a:t>
             </a:r>
           </a:p>
           <a:p>
             <a:pPr lvl="1"/>
             <a:r>
-              <a:rPr lang="en-US" smtClean="0"/>
+              <a:rPr lang="en-US"/>
               <a:t>Second level</a:t>
             </a:r>
           </a:p>
           <a:p>
             <a:pPr lvl="2"/>
             <a:r>
-              <a:rPr lang="en-US" smtClean="0"/>
+              <a:rPr lang="en-US"/>
               <a:t>Third level</a:t>
             </a:r>
           </a:p>
@@ -14733,13 +14363,6 @@
   <p:transition spd="med">
     <p:fade/>
   </p:transition>
-  <p:timing>
-    <p:tnLst>
-      <p:par>
-        <p:cTn id="1" dur="indefinite" restart="never" nodeType="tmRoot"/>
-      </p:par>
-    </p:tnLst>
-  </p:timing>
 </p:sldLayout>
 </file>
 
@@ -14813,14 +14436,14 @@
           </a:ln>
           <a:extLst>
             <a:ext uri="{909E8E84-426E-40dd-AFC4-6F175D3DCCD1}">
-              <a14:hiddenFill xmlns="" xmlns:a14="http://schemas.microsoft.com/office/drawing/2010/main">
+              <a14:hiddenFill xmlns:a14="http://schemas.microsoft.com/office/drawing/2010/main" xmlns="">
                 <a:solidFill>
                   <a:srgbClr val="FFFFFF"/>
                 </a:solidFill>
               </a14:hiddenFill>
             </a:ext>
             <a:ext uri="{91240B29-F687-4f45-9708-019B960494DF}">
-              <a14:hiddenLine xmlns="" xmlns:a14="http://schemas.microsoft.com/office/drawing/2010/main" w="9525">
+              <a14:hiddenLine xmlns:a14="http://schemas.microsoft.com/office/drawing/2010/main" xmlns="" w="9525">
                 <a:solidFill>
                   <a:srgbClr val="000000"/>
                 </a:solidFill>
@@ -14857,7 +14480,7 @@
           </a:lstStyle>
           <a:p>
             <a:r>
-              <a:rPr lang="en-US" smtClean="0"/>
+              <a:rPr lang="en-US"/>
               <a:t>Click to edit Master title style</a:t>
             </a:r>
             <a:endParaRPr lang="en-US" dirty="0"/>
@@ -14927,7 +14550,7 @@
           <a:p>
             <a:pPr lvl="0"/>
             <a:r>
-              <a:rPr lang="en-US" dirty="0" smtClean="0"/>
+              <a:rPr lang="en-US" dirty="0"/>
               <a:t>SOURCE</a:t>
             </a:r>
           </a:p>
@@ -14971,22 +14594,22 @@
           <a:p>
             <a:pPr lvl="0"/>
             <a:r>
-              <a:rPr lang="en-US" dirty="0" smtClean="0"/>
+              <a:rPr lang="en-US" dirty="0"/>
               <a:t>/</a:t>
             </a:r>
             <a:r>
-              <a:rPr lang="en-US" dirty="0" err="1" smtClean="0"/>
+              <a:rPr lang="en-US" dirty="0" err="1"/>
               <a:t>filepath</a:t>
             </a:r>
             <a:r>
-              <a:rPr lang="en-US" dirty="0" smtClean="0"/>
+              <a:rPr lang="en-US" dirty="0"/>
               <a:t>/</a:t>
             </a:r>
             <a:r>
-              <a:rPr lang="en-US" dirty="0" err="1" smtClean="0"/>
+              <a:rPr lang="en-US" dirty="0" err="1"/>
               <a:t>file.rb</a:t>
             </a:r>
-            <a:endParaRPr lang="en-US" dirty="0" smtClean="0"/>
+            <a:endParaRPr lang="en-US" dirty="0"/>
           </a:p>
         </p:txBody>
       </p:sp>
@@ -15028,7 +14651,7 @@
           <a:p>
             <a:pPr lvl="0"/>
             <a:r>
-              <a:rPr lang="en-US" dirty="0" smtClean="0"/>
+              <a:rPr lang="en-US" dirty="0"/>
               <a:t>-</a:t>
             </a:r>
           </a:p>
@@ -15072,7 +14695,7 @@
           <a:p>
             <a:pPr lvl="0"/>
             <a:r>
-              <a:rPr lang="en-US" dirty="0" smtClean="0"/>
+              <a:rPr lang="en-US" dirty="0"/>
               <a:t>+</a:t>
             </a:r>
           </a:p>
@@ -15091,13 +14714,6 @@
   <p:transition spd="med">
     <p:fade/>
   </p:transition>
-  <p:timing>
-    <p:tnLst>
-      <p:par>
-        <p:cTn id="1" dur="indefinite" restart="never" nodeType="tmRoot"/>
-      </p:par>
-    </p:tnLst>
-  </p:timing>
 </p:sldLayout>
 </file>
 
@@ -15161,7 +14777,7 @@
           </a:lstStyle>
           <a:p>
             <a:r>
-              <a:rPr lang="en-US" smtClean="0"/>
+              <a:rPr lang="en-US"/>
               <a:t>Click to edit Master title style</a:t>
             </a:r>
             <a:endParaRPr lang="en-US" dirty="0"/>
@@ -15219,7 +14835,7 @@
           <a:p>
             <a:pPr lvl="0"/>
             <a:r>
-              <a:rPr lang="en-US" dirty="0" smtClean="0"/>
+              <a:rPr lang="en-US" dirty="0"/>
               <a:t>source code without a file</a:t>
             </a:r>
           </a:p>
@@ -15263,7 +14879,7 @@
           <a:p>
             <a:pPr lvl="0"/>
             <a:r>
-              <a:rPr lang="en-US" dirty="0" smtClean="0"/>
+              <a:rPr lang="en-US" dirty="0"/>
               <a:t>-</a:t>
             </a:r>
           </a:p>
@@ -15307,7 +14923,7 @@
           <a:p>
             <a:pPr lvl="0"/>
             <a:r>
-              <a:rPr lang="en-US" dirty="0" smtClean="0"/>
+              <a:rPr lang="en-US" dirty="0"/>
               <a:t>+</a:t>
             </a:r>
           </a:p>
@@ -15326,13 +14942,6 @@
   <p:transition spd="med">
     <p:fade/>
   </p:transition>
-  <p:timing>
-    <p:tnLst>
-      <p:par>
-        <p:cTn id="1" dur="indefinite" restart="never" nodeType="tmRoot"/>
-      </p:par>
-    </p:tnLst>
-  </p:timing>
 </p:sldLayout>
 </file>
 
@@ -15396,7 +15005,7 @@
           </a:lstStyle>
           <a:p>
             <a:r>
-              <a:rPr lang="en-US" smtClean="0"/>
+              <a:rPr lang="en-US"/>
               <a:t>Click to edit Master title style</a:t>
             </a:r>
             <a:endParaRPr lang="en-US" dirty="0"/>
@@ -15454,7 +15063,7 @@
           <a:p>
             <a:pPr lvl="0"/>
             <a:r>
-              <a:rPr lang="en-US" dirty="0" smtClean="0"/>
+              <a:rPr lang="en-US" dirty="0"/>
               <a:t>source code</a:t>
             </a:r>
           </a:p>
@@ -15500,21 +15109,21 @@
           <a:p>
             <a:pPr lvl="0"/>
             <a:r>
-              <a:rPr lang="en-US" smtClean="0"/>
+              <a:rPr lang="en-US"/>
               <a:t>Click to edit Master text styles</a:t>
             </a:r>
           </a:p>
           <a:p>
             <a:pPr lvl="1"/>
             <a:r>
-              <a:rPr lang="en-US" smtClean="0"/>
+              <a:rPr lang="en-US"/>
               <a:t>Second level</a:t>
             </a:r>
           </a:p>
           <a:p>
             <a:pPr lvl="2"/>
             <a:r>
-              <a:rPr lang="en-US" smtClean="0"/>
+              <a:rPr lang="en-US"/>
               <a:t>Third level</a:t>
             </a:r>
           </a:p>
@@ -15558,7 +15167,7 @@
           <a:p>
             <a:pPr lvl="0"/>
             <a:r>
-              <a:rPr lang="en-US" dirty="0" smtClean="0"/>
+              <a:rPr lang="en-US" dirty="0"/>
               <a:t>-</a:t>
             </a:r>
           </a:p>
@@ -15602,7 +15211,7 @@
           <a:p>
             <a:pPr lvl="0"/>
             <a:r>
-              <a:rPr lang="en-US" dirty="0" smtClean="0"/>
+              <a:rPr lang="en-US" dirty="0"/>
               <a:t>+</a:t>
             </a:r>
           </a:p>
@@ -15621,13 +15230,6 @@
   <p:transition spd="med">
     <p:fade/>
   </p:transition>
-  <p:timing>
-    <p:tnLst>
-      <p:par>
-        <p:cTn id="1" dur="indefinite" restart="never" nodeType="tmRoot"/>
-      </p:par>
-    </p:tnLst>
-  </p:timing>
 </p:sldLayout>
 </file>
 
@@ -15692,7 +15294,7 @@
           <a:lstStyle/>
           <a:p>
             <a:r>
-              <a:rPr lang="en-CA" dirty="0" smtClean="0"/>
+              <a:rPr lang="en-CA" dirty="0"/>
               <a:t>Title Text</a:t>
             </a:r>
             <a:endParaRPr lang="en-US" dirty="0"/>
@@ -15726,21 +15328,21 @@
           <a:p>
             <a:pPr lvl="0"/>
             <a:r>
-              <a:rPr lang="en-US" dirty="0" smtClean="0"/>
+              <a:rPr lang="en-US" dirty="0"/>
               <a:t>Click to edit Master text styles</a:t>
             </a:r>
           </a:p>
           <a:p>
             <a:pPr lvl="1"/>
             <a:r>
-              <a:rPr lang="en-US" dirty="0" smtClean="0"/>
+              <a:rPr lang="en-US" dirty="0"/>
               <a:t>Second level</a:t>
             </a:r>
           </a:p>
           <a:p>
             <a:pPr lvl="2"/>
             <a:r>
-              <a:rPr lang="en-US" dirty="0" smtClean="0"/>
+              <a:rPr lang="en-US" dirty="0"/>
               <a:t>Third level</a:t>
             </a:r>
           </a:p>
@@ -15781,14 +15383,14 @@
           </a:ln>
           <a:extLst>
             <a:ext uri="{909E8E84-426E-40dd-AFC4-6F175D3DCCD1}">
-              <a14:hiddenFill xmlns="" xmlns:a14="http://schemas.microsoft.com/office/drawing/2010/main">
+              <a14:hiddenFill xmlns:a14="http://schemas.microsoft.com/office/drawing/2010/main" xmlns="">
                 <a:solidFill>
                   <a:srgbClr val="FFFFFF"/>
                 </a:solidFill>
               </a14:hiddenFill>
             </a:ext>
             <a:ext uri="{91240B29-F687-4f45-9708-019B960494DF}">
-              <a14:hiddenLine xmlns="" xmlns:a14="http://schemas.microsoft.com/office/drawing/2010/main" w="9525">
+              <a14:hiddenLine xmlns:a14="http://schemas.microsoft.com/office/drawing/2010/main" xmlns="" w="9525">
                 <a:solidFill>
                   <a:srgbClr val="000000"/>
                 </a:solidFill>
@@ -15868,7 +15470,7 @@
               <a:defRPr/>
             </a:pPr>
             <a:r>
-              <a:rPr lang="en-US" dirty="0" smtClean="0">
+              <a:rPr lang="en-US" dirty="0">
                 <a:solidFill>
                   <a:srgbClr val="7D868C"/>
                 </a:solidFill>
@@ -15879,7 +15481,7 @@
               <a:t>©</a:t>
             </a:r>
             <a:r>
-              <a:rPr lang="is-IS" dirty="0" smtClean="0">
+              <a:rPr lang="is-IS" dirty="0">
                 <a:solidFill>
                   <a:srgbClr val="7D868C"/>
                 </a:solidFill>
@@ -15890,17 +15492,6 @@
               <a:t>2017</a:t>
             </a:r>
             <a:r>
-              <a:rPr lang="en-US" dirty="0" smtClean="0">
-                <a:solidFill>
-                  <a:srgbClr val="7D868C"/>
-                </a:solidFill>
-                <a:latin typeface="+mn-lt"/>
-                <a:ea typeface="+mn-ea"/>
-                <a:cs typeface="+mn-cs"/>
-              </a:rPr>
-              <a:t> </a:t>
-            </a:r>
-            <a:r>
               <a:rPr lang="en-US" dirty="0">
                 <a:solidFill>
                   <a:srgbClr val="7D868C"/>
@@ -15909,7 +15500,7 @@
                 <a:ea typeface="+mn-ea"/>
                 <a:cs typeface="+mn-cs"/>
               </a:rPr>
-              <a:t>Chef Software Inc</a:t>
+              <a:t> Chef Software Inc</a:t>
             </a:r>
             <a:r>
               <a:rPr lang="en-US" dirty="0">
@@ -15977,18 +15568,7 @@
                 <a:ea typeface="+mn-ea"/>
                 <a:cs typeface="+mn-cs"/>
               </a:rPr>
-              <a:t>2</a:t>
-            </a:r>
-            <a:r>
-              <a:rPr lang="en-US" dirty="0" smtClean="0">
-                <a:solidFill>
-                  <a:srgbClr val="7F7F7F"/>
-                </a:solidFill>
-                <a:latin typeface="+mn-lt"/>
-                <a:ea typeface="+mn-ea"/>
-                <a:cs typeface="+mn-cs"/>
-              </a:rPr>
-              <a:t>-</a:t>
+              <a:t>2-</a:t>
             </a:r>
             <a:fld id="{F0B79B2F-E1DD-4D43-95B3-EA08C411D807}" type="slidenum">
               <a:rPr lang="en-US" smtClean="0">
@@ -16041,13 +15621,6 @@
   <p:transition spd="med">
     <p:fade/>
   </p:transition>
-  <p:timing>
-    <p:tnLst>
-      <p:par>
-        <p:cTn id="1" dur="indefinite" restart="never" nodeType="tmRoot"/>
-      </p:par>
-    </p:tnLst>
-  </p:timing>
   <p:hf hdr="0" dt="0"/>
   <p:txStyles>
     <p:titleStyle>
@@ -16530,7 +16103,7 @@
           <a:lstStyle/>
           <a:p>
             <a:r>
-              <a:rPr lang="en-CA" dirty="0" smtClean="0"/>
+              <a:rPr lang="en-CA" dirty="0"/>
               <a:t>Title Text</a:t>
             </a:r>
             <a:endParaRPr lang="en-US" dirty="0"/>
@@ -16572,14 +16145,14 @@
           </a:ln>
           <a:extLst>
             <a:ext uri="{909E8E84-426E-40dd-AFC4-6F175D3DCCD1}">
-              <a14:hiddenFill xmlns="" xmlns:a14="http://schemas.microsoft.com/office/drawing/2010/main">
+              <a14:hiddenFill xmlns:a14="http://schemas.microsoft.com/office/drawing/2010/main" xmlns="">
                 <a:solidFill>
                   <a:srgbClr val="FFFFFF"/>
                 </a:solidFill>
               </a14:hiddenFill>
             </a:ext>
             <a:ext uri="{91240B29-F687-4f45-9708-019B960494DF}">
-              <a14:hiddenLine xmlns="" xmlns:a14="http://schemas.microsoft.com/office/drawing/2010/main" w="9525">
+              <a14:hiddenLine xmlns:a14="http://schemas.microsoft.com/office/drawing/2010/main" xmlns="" w="9525">
                 <a:solidFill>
                   <a:srgbClr val="000000"/>
                 </a:solidFill>
@@ -16659,7 +16232,7 @@
               <a:defRPr/>
             </a:pPr>
             <a:r>
-              <a:rPr lang="en-US" dirty="0" smtClean="0">
+              <a:rPr lang="en-US" dirty="0">
                 <a:solidFill>
                   <a:srgbClr val="7D868C"/>
                 </a:solidFill>
@@ -16670,7 +16243,7 @@
               <a:t>©</a:t>
             </a:r>
             <a:r>
-              <a:rPr lang="is-IS" dirty="0" smtClean="0">
+              <a:rPr lang="is-IS" dirty="0">
                 <a:solidFill>
                   <a:srgbClr val="7D868C"/>
                 </a:solidFill>
@@ -16681,17 +16254,6 @@
               <a:t>2017</a:t>
             </a:r>
             <a:r>
-              <a:rPr lang="en-US" dirty="0" smtClean="0">
-                <a:solidFill>
-                  <a:srgbClr val="7D868C"/>
-                </a:solidFill>
-                <a:latin typeface="+mn-lt"/>
-                <a:ea typeface="+mn-ea"/>
-                <a:cs typeface="+mn-cs"/>
-              </a:rPr>
-              <a:t> </a:t>
-            </a:r>
-            <a:r>
               <a:rPr lang="en-US" dirty="0">
                 <a:solidFill>
                   <a:srgbClr val="7D868C"/>
@@ -16700,7 +16262,7 @@
                 <a:ea typeface="+mn-ea"/>
                 <a:cs typeface="+mn-cs"/>
               </a:rPr>
-              <a:t>Chef Software Inc</a:t>
+              <a:t> Chef Software Inc</a:t>
             </a:r>
             <a:r>
               <a:rPr lang="en-US" dirty="0">
@@ -16768,18 +16330,7 @@
                 <a:ea typeface="+mn-ea"/>
                 <a:cs typeface="+mn-cs"/>
               </a:rPr>
-              <a:t>2</a:t>
-            </a:r>
-            <a:r>
-              <a:rPr lang="en-US" dirty="0" smtClean="0">
-                <a:solidFill>
-                  <a:srgbClr val="7F7F7F"/>
-                </a:solidFill>
-                <a:latin typeface="+mn-lt"/>
-                <a:ea typeface="+mn-ea"/>
-                <a:cs typeface="+mn-cs"/>
-              </a:rPr>
-              <a:t>-</a:t>
+              <a:t>2-</a:t>
             </a:r>
             <a:fld id="{F0B79B2F-E1DD-4D43-95B3-EA08C411D807}" type="slidenum">
               <a:rPr lang="en-US" smtClean="0">
@@ -16903,13 +16454,6 @@
   <p:transition spd="med">
     <p:fade/>
   </p:transition>
-  <p:timing>
-    <p:tnLst>
-      <p:par>
-        <p:cTn id="1" dur="indefinite" restart="never" nodeType="tmRoot"/>
-      </p:par>
-    </p:tnLst>
-  </p:timing>
   <p:hf hdr="0" dt="0"/>
   <p:txStyles>
     <p:titleStyle>
@@ -17364,10 +16908,9 @@
           <a:lstStyle/>
           <a:p>
             <a:r>
-              <a:rPr lang="en-US" dirty="0" smtClean="0"/>
+              <a:rPr lang="en-US" dirty="0"/>
               <a:t>Why Write Tests? Why is that Hard?</a:t>
             </a:r>
-            <a:endParaRPr lang="en-US" dirty="0"/>
           </a:p>
         </p:txBody>
       </p:sp>
@@ -17403,13 +16946,6 @@
   <p:transition spd="med">
     <p:fade/>
   </p:transition>
-  <p:timing>
-    <p:tnLst>
-      <p:par>
-        <p:cTn id="1" dur="indefinite" restart="never" nodeType="tmRoot"/>
-      </p:par>
-    </p:tnLst>
-  </p:timing>
 </p:sld>
 </file>
 
@@ -17448,10 +16984,9 @@
           <a:lstStyle/>
           <a:p>
             <a:r>
-              <a:rPr lang="en-US" sz="5400" dirty="0" smtClean="0"/>
+              <a:rPr lang="en-US" sz="5400" dirty="0"/>
               <a:t>Why Write Tests? Why is that Hard?</a:t>
             </a:r>
-            <a:endParaRPr lang="en-US" sz="5400" dirty="0"/>
           </a:p>
         </p:txBody>
       </p:sp>
@@ -17471,10 +17006,9 @@
           <a:lstStyle/>
           <a:p>
             <a:r>
-              <a:rPr lang="en-US" dirty="0" smtClean="0"/>
+              <a:rPr lang="en-US" dirty="0"/>
               <a:t>To test or not to tests. It's no longer the question. Now I need to think: what makes writing tests challenging?</a:t>
             </a:r>
-            <a:endParaRPr lang="en-US" dirty="0"/>
           </a:p>
         </p:txBody>
       </p:sp>
@@ -17498,7 +17032,7 @@
               <a:buChar char="ü"/>
             </a:pPr>
             <a:r>
-              <a:rPr lang="en-US" dirty="0" smtClean="0"/>
+              <a:rPr lang="en-US" dirty="0"/>
               <a:t>Discussion about Writing Tests</a:t>
             </a:r>
           </a:p>
@@ -17508,10 +17042,9 @@
               <a:buChar char="q"/>
             </a:pPr>
             <a:r>
-              <a:rPr lang="en-US" dirty="0" smtClean="0"/>
+              <a:rPr lang="en-US" dirty="0"/>
               <a:t>Discussion about Why Writing Tests is Hard</a:t>
             </a:r>
-            <a:endParaRPr lang="en-US" dirty="0"/>
           </a:p>
         </p:txBody>
       </p:sp>
@@ -17528,13 +17061,6 @@
   <p:transition spd="med">
     <p:fade/>
   </p:transition>
-  <p:timing>
-    <p:tnLst>
-      <p:par>
-        <p:cTn id="1" dur="indefinite" restart="never" nodeType="tmRoot"/>
-      </p:par>
-    </p:tnLst>
-  </p:timing>
 </p:sld>
 </file>
 
@@ -17573,10 +17099,9 @@
           <a:lstStyle/>
           <a:p>
             <a:r>
-              <a:rPr lang="en-US" dirty="0" smtClean="0"/>
+              <a:rPr lang="en-US" dirty="0"/>
               <a:t>Another Language</a:t>
             </a:r>
-            <a:endParaRPr lang="en-US" dirty="0"/>
           </a:p>
         </p:txBody>
       </p:sp>
@@ -17596,10 +17121,9 @@
           <a:lstStyle/>
           <a:p>
             <a:r>
-              <a:rPr lang="en-US" dirty="0" smtClean="0"/>
+              <a:rPr lang="en-US" dirty="0"/>
               <a:t>Learning to write tests require you to learn a whole new language that you must understand grammatically.</a:t>
             </a:r>
-            <a:endParaRPr lang="en-US" dirty="0"/>
           </a:p>
         </p:txBody>
       </p:sp>
@@ -17616,13 +17140,6 @@
   <p:transition spd="med">
     <p:fade/>
   </p:transition>
-  <p:timing>
-    <p:tnLst>
-      <p:par>
-        <p:cTn id="1" dur="indefinite" restart="never" nodeType="tmRoot"/>
-      </p:par>
-    </p:tnLst>
-  </p:timing>
 </p:sld>
 </file>
 
@@ -17661,10 +17178,9 @@
           <a:lstStyle/>
           <a:p>
             <a:r>
-              <a:rPr lang="en-US" dirty="0" smtClean="0"/>
+              <a:rPr lang="en-US" dirty="0"/>
               <a:t>Another Workflow</a:t>
             </a:r>
-            <a:endParaRPr lang="en-US" dirty="0"/>
           </a:p>
         </p:txBody>
       </p:sp>
@@ -17684,10 +17200,9 @@
           <a:lstStyle/>
           <a:p>
             <a:r>
-              <a:rPr lang="en-US" dirty="0" smtClean="0"/>
+              <a:rPr lang="en-US" dirty="0"/>
               <a:t>Executing tests requires learning new tools, commands, flags and configurations with entirely new mechanisms that provide you feedback.</a:t>
             </a:r>
-            <a:endParaRPr lang="en-US" dirty="0"/>
           </a:p>
         </p:txBody>
       </p:sp>
@@ -17704,13 +17219,6 @@
   <p:transition spd="med">
     <p:fade/>
   </p:transition>
-  <p:timing>
-    <p:tnLst>
-      <p:par>
-        <p:cTn id="1" dur="indefinite" restart="never" nodeType="tmRoot"/>
-      </p:par>
-    </p:tnLst>
-  </p:timing>
 </p:sld>
 </file>
 
@@ -17749,10 +17257,9 @@
           <a:lstStyle/>
           <a:p>
             <a:r>
-              <a:rPr lang="en-US" dirty="0" smtClean="0"/>
+              <a:rPr lang="en-US" dirty="0"/>
               <a:t>Discussion</a:t>
             </a:r>
-            <a:endParaRPr lang="en-US" dirty="0"/>
           </a:p>
         </p:txBody>
       </p:sp>
@@ -17772,7 +17279,7 @@
           <a:lstStyle/>
           <a:p>
             <a:r>
-              <a:rPr lang="en-US" dirty="0" smtClean="0"/>
+              <a:rPr lang="en-US" dirty="0"/>
               <a:t>What are reasons you see that make testing hard?</a:t>
             </a:r>
           </a:p>
@@ -17781,10 +17288,9 @@
           </a:p>
           <a:p>
             <a:r>
-              <a:rPr lang="en-US" dirty="0" smtClean="0"/>
+              <a:rPr lang="en-US" dirty="0"/>
               <a:t>What are some of the the ways in which you have made it less hard?</a:t>
             </a:r>
-            <a:endParaRPr lang="en-US" dirty="0"/>
           </a:p>
         </p:txBody>
       </p:sp>
@@ -17801,13 +17307,6 @@
   <p:transition spd="med">
     <p:fade/>
   </p:transition>
-  <p:timing>
-    <p:tnLst>
-      <p:par>
-        <p:cTn id="1" dur="indefinite" restart="never" nodeType="tmRoot"/>
-      </p:par>
-    </p:tnLst>
-  </p:timing>
 </p:sld>
 </file>
 
@@ -17846,10 +17345,9 @@
           <a:lstStyle/>
           <a:p>
             <a:r>
-              <a:rPr lang="en-US" sz="5400" dirty="0" smtClean="0"/>
+              <a:rPr lang="en-US" sz="5400" dirty="0"/>
               <a:t>Why Write Tests? Why is that Hard?</a:t>
             </a:r>
-            <a:endParaRPr lang="en-US" sz="5400" dirty="0"/>
           </a:p>
         </p:txBody>
       </p:sp>
@@ -17869,10 +17367,9 @@
           <a:lstStyle/>
           <a:p>
             <a:r>
-              <a:rPr lang="en-US" dirty="0" smtClean="0"/>
+              <a:rPr lang="en-US" dirty="0"/>
               <a:t>I may or may not be convinced. The important thing is I understand what others around me think ... now I have more information to make up my mind.</a:t>
             </a:r>
-            <a:endParaRPr lang="en-US" dirty="0"/>
           </a:p>
         </p:txBody>
       </p:sp>
@@ -17896,7 +17393,7 @@
               <a:buChar char="ü"/>
             </a:pPr>
             <a:r>
-              <a:rPr lang="en-US" dirty="0" smtClean="0"/>
+              <a:rPr lang="en-US" dirty="0"/>
               <a:t>Discussion about Writing Tests</a:t>
             </a:r>
           </a:p>
@@ -17906,10 +17403,9 @@
               <a:buChar char="ü"/>
             </a:pPr>
             <a:r>
-              <a:rPr lang="en-US" dirty="0" smtClean="0"/>
+              <a:rPr lang="en-US" dirty="0"/>
               <a:t>Discussion about Why Writing Tests is Hard</a:t>
             </a:r>
-            <a:endParaRPr lang="en-US" dirty="0"/>
           </a:p>
         </p:txBody>
       </p:sp>
@@ -17926,13 +17422,6 @@
   <p:transition spd="med">
     <p:fade/>
   </p:transition>
-  <p:timing>
-    <p:tnLst>
-      <p:par>
-        <p:cTn id="1" dur="indefinite" restart="never" nodeType="tmRoot"/>
-      </p:par>
-    </p:tnLst>
-  </p:timing>
 </p:sld>
 </file>
 
@@ -17971,10 +17460,9 @@
           <a:lstStyle/>
           <a:p>
             <a:r>
-              <a:rPr lang="en-US" dirty="0" smtClean="0"/>
+              <a:rPr lang="en-US" dirty="0"/>
               <a:t>Q&amp;A</a:t>
             </a:r>
-            <a:endParaRPr lang="en-US" dirty="0"/>
           </a:p>
         </p:txBody>
       </p:sp>
@@ -17994,10 +17482,9 @@
           <a:lstStyle/>
           <a:p>
             <a:r>
-              <a:rPr lang="en-US" dirty="0" smtClean="0"/>
+              <a:rPr lang="en-US" dirty="0"/>
               <a:t>What questions can we answer for you?</a:t>
             </a:r>
-            <a:endParaRPr lang="en-US" dirty="0"/>
           </a:p>
         </p:txBody>
       </p:sp>
@@ -18014,13 +17501,6 @@
   <p:transition spd="med">
     <p:fade/>
   </p:transition>
-  <p:timing>
-    <p:tnLst>
-      <p:par>
-        <p:cTn id="1" dur="indefinite" restart="never" nodeType="tmRoot"/>
-      </p:par>
-    </p:tnLst>
-  </p:timing>
 </p:sld>
 </file>
 
@@ -18054,13 +17534,6 @@
   <p:transition spd="med">
     <p:fade/>
   </p:transition>
-  <p:timing>
-    <p:tnLst>
-      <p:par>
-        <p:cTn id="1" dur="indefinite" restart="never" nodeType="tmRoot"/>
-      </p:par>
-    </p:tnLst>
-  </p:timing>
 </p:sld>
 </file>
 
@@ -18099,10 +17572,9 @@
           <a:lstStyle/>
           <a:p>
             <a:r>
-              <a:rPr lang="en-US" sz="5400" dirty="0" smtClean="0"/>
+              <a:rPr lang="en-US" sz="5400" dirty="0"/>
               <a:t>Why Write Tests? Why is that Hard?</a:t>
             </a:r>
-            <a:endParaRPr lang="en-US" sz="5400" dirty="0"/>
           </a:p>
         </p:txBody>
       </p:sp>
@@ -18122,10 +17594,9 @@
           <a:lstStyle/>
           <a:p>
             <a:r>
-              <a:rPr lang="en-US" dirty="0" smtClean="0"/>
+              <a:rPr lang="en-US" dirty="0"/>
               <a:t>Should I write a test? Perhaps the answer to that question lies in: why write tests?</a:t>
             </a:r>
-            <a:endParaRPr lang="en-US" dirty="0"/>
           </a:p>
         </p:txBody>
       </p:sp>
@@ -18149,7 +17620,7 @@
               <a:buChar char="q"/>
             </a:pPr>
             <a:r>
-              <a:rPr lang="en-US" dirty="0" smtClean="0"/>
+              <a:rPr lang="en-US" dirty="0"/>
               <a:t>Discussion about Writing Tests</a:t>
             </a:r>
           </a:p>
@@ -18159,10 +17630,9 @@
               <a:buChar char="q"/>
             </a:pPr>
             <a:r>
-              <a:rPr lang="en-US" dirty="0" smtClean="0"/>
+              <a:rPr lang="en-US" dirty="0"/>
               <a:t>Discussion about Why Writing Tests is Hard</a:t>
             </a:r>
-            <a:endParaRPr lang="en-US" dirty="0"/>
           </a:p>
         </p:txBody>
       </p:sp>
@@ -18179,13 +17649,6 @@
   <p:transition spd="med">
     <p:fade/>
   </p:transition>
-  <p:timing>
-    <p:tnLst>
-      <p:par>
-        <p:cTn id="1" dur="indefinite" restart="never" nodeType="tmRoot"/>
-      </p:par>
-    </p:tnLst>
-  </p:timing>
 </p:sld>
 </file>
 
@@ -18224,10 +17687,9 @@
           <a:lstStyle/>
           <a:p>
             <a:r>
-              <a:rPr lang="en-US" sz="6600" dirty="0" smtClean="0"/>
+              <a:rPr lang="en-US" sz="6600" dirty="0"/>
               <a:t>Current Cookbook Development Workflow</a:t>
             </a:r>
-            <a:endParaRPr lang="en-US" sz="6600" dirty="0"/>
           </a:p>
         </p:txBody>
       </p:sp>
@@ -18371,7 +17833,7 @@
               <a:lstStyle/>
               <a:p>
                 <a:pPr algn="ctr" defTabSz="914099"/>
-                <a:endParaRPr lang="en-US" sz="2400" dirty="0" err="1" smtClean="0">
+                <a:endParaRPr lang="en-US" sz="2400" dirty="0" err="1">
                   <a:gradFill>
                     <a:gsLst>
                       <a:gs pos="0">
@@ -18457,13 +17919,6 @@
   <p:transition spd="med">
     <p:fade/>
   </p:transition>
-  <p:timing>
-    <p:tnLst>
-      <p:par>
-        <p:cTn id="1" dur="indefinite" restart="never" nodeType="tmRoot"/>
-      </p:par>
-    </p:tnLst>
-  </p:timing>
 </p:sld>
 </file>
 
@@ -18502,10 +17957,9 @@
           <a:lstStyle/>
           <a:p>
             <a:r>
-              <a:rPr lang="en-US" sz="6600" dirty="0" smtClean="0"/>
+              <a:rPr lang="en-US" sz="6600" dirty="0"/>
               <a:t>Current Cookbook Development Workflow</a:t>
             </a:r>
-            <a:endParaRPr lang="en-US" sz="6600" dirty="0"/>
           </a:p>
         </p:txBody>
       </p:sp>
@@ -18632,7 +18086,7 @@
             <a:lstStyle/>
             <a:p>
               <a:pPr algn="ctr" defTabSz="914099"/>
-              <a:endParaRPr lang="en-US" sz="2400" dirty="0" err="1" smtClean="0">
+              <a:endParaRPr lang="en-US" sz="2400" dirty="0" err="1">
                 <a:gradFill>
                   <a:gsLst>
                     <a:gs pos="0">
@@ -18781,7 +18235,7 @@
               <a:lstStyle/>
               <a:p>
                 <a:pPr algn="ctr" defTabSz="914099"/>
-                <a:endParaRPr lang="en-US" sz="2400" dirty="0" err="1" smtClean="0">
+                <a:endParaRPr lang="en-US" sz="2400" dirty="0" err="1">
                   <a:gradFill>
                     <a:gsLst>
                       <a:gs pos="0">
@@ -18867,13 +18321,6 @@
   <p:transition spd="med">
     <p:fade/>
   </p:transition>
-  <p:timing>
-    <p:tnLst>
-      <p:par>
-        <p:cTn id="1" dur="indefinite" restart="never" nodeType="tmRoot"/>
-      </p:par>
-    </p:tnLst>
-  </p:timing>
 </p:sld>
 </file>
 
@@ -18912,10 +18359,9 @@
           <a:lstStyle/>
           <a:p>
             <a:r>
-              <a:rPr lang="en-US" sz="6600" dirty="0" smtClean="0"/>
+              <a:rPr lang="en-US" sz="6600" dirty="0"/>
               <a:t>Current Cookbook Development Workflow</a:t>
             </a:r>
-            <a:endParaRPr lang="en-US" sz="6600" dirty="0"/>
           </a:p>
         </p:txBody>
       </p:sp>
@@ -19056,7 +18502,7 @@
               <a:lstStyle/>
               <a:p>
                 <a:pPr algn="ctr" defTabSz="914099"/>
-                <a:endParaRPr lang="en-US" sz="2400" dirty="0" err="1" smtClean="0">
+                <a:endParaRPr lang="en-US" sz="2400" dirty="0" err="1">
                   <a:gradFill>
                     <a:gsLst>
                       <a:gs pos="0">
@@ -19192,7 +18638,7 @@
             <a:lstStyle/>
             <a:p>
               <a:pPr algn="ctr" defTabSz="914099"/>
-              <a:endParaRPr lang="en-US" sz="2400" dirty="0" err="1" smtClean="0">
+              <a:endParaRPr lang="en-US" sz="2400" dirty="0" err="1">
                 <a:gradFill>
                   <a:gsLst>
                     <a:gs pos="0">
@@ -19277,13 +18723,6 @@
   <p:transition spd="med">
     <p:fade/>
   </p:transition>
-  <p:timing>
-    <p:tnLst>
-      <p:par>
-        <p:cTn id="1" dur="indefinite" restart="never" nodeType="tmRoot"/>
-      </p:par>
-    </p:tnLst>
-  </p:timing>
 </p:sld>
 </file>
 
@@ -19322,10 +18761,9 @@
           <a:lstStyle/>
           <a:p>
             <a:r>
-              <a:rPr lang="en-US" dirty="0" smtClean="0"/>
+              <a:rPr lang="en-US" dirty="0"/>
               <a:t>Risk</a:t>
             </a:r>
-            <a:endParaRPr lang="en-US" dirty="0"/>
           </a:p>
         </p:txBody>
       </p:sp>
@@ -19345,10 +18783,9 @@
           <a:lstStyle/>
           <a:p>
             <a:r>
-              <a:rPr lang="en-US" dirty="0" smtClean="0"/>
+              <a:rPr lang="en-US" dirty="0"/>
               <a:t>Every change to our cookbooks introduce risk. Validating every change would take too long in this system. To alleviate that we often batch these changes up. Batching up the changes make it harder to discover when we introduced an error.</a:t>
             </a:r>
-            <a:endParaRPr lang="en-US" dirty="0"/>
           </a:p>
         </p:txBody>
       </p:sp>
@@ -19365,13 +18802,6 @@
   <p:transition spd="med">
     <p:fade/>
   </p:transition>
-  <p:timing>
-    <p:tnLst>
-      <p:par>
-        <p:cTn id="1" dur="indefinite" restart="never" nodeType="tmRoot"/>
-      </p:par>
-    </p:tnLst>
-  </p:timing>
 </p:sld>
 </file>
 
@@ -19427,13 +18857,6 @@
   <p:transition spd="med">
     <p:fade/>
   </p:transition>
-  <p:timing>
-    <p:tnLst>
-      <p:par>
-        <p:cTn id="1" dur="indefinite" restart="never" nodeType="tmRoot"/>
-      </p:par>
-    </p:tnLst>
-  </p:timing>
 </p:sld>
 </file>
 
@@ -19489,13 +18912,6 @@
   <p:transition spd="med">
     <p:fade/>
   </p:transition>
-  <p:timing>
-    <p:tnLst>
-      <p:par>
-        <p:cTn id="1" dur="indefinite" restart="never" nodeType="tmRoot"/>
-      </p:par>
-    </p:tnLst>
-  </p:timing>
 </p:sld>
 </file>
 
@@ -19534,10 +18950,9 @@
           <a:lstStyle/>
           <a:p>
             <a:r>
-              <a:rPr lang="en-US" dirty="0" smtClean="0"/>
+              <a:rPr lang="en-US" dirty="0"/>
               <a:t>Discussion</a:t>
             </a:r>
-            <a:endParaRPr lang="en-US" dirty="0"/>
           </a:p>
         </p:txBody>
       </p:sp>
@@ -19557,7 +18972,7 @@
           <a:lstStyle/>
           <a:p>
             <a:r>
-              <a:rPr lang="en-US" dirty="0" smtClean="0"/>
+              <a:rPr lang="en-US" dirty="0"/>
               <a:t>What are reasons you see for writing tests?</a:t>
             </a:r>
           </a:p>
@@ -19566,7 +18981,7 @@
           </a:p>
           <a:p>
             <a:r>
-              <a:rPr lang="en-US" dirty="0" smtClean="0"/>
+              <a:rPr lang="en-US" dirty="0"/>
               <a:t>What are reasons you see for not writing tests?</a:t>
             </a:r>
           </a:p>
@@ -19585,13 +19000,6 @@
   <p:transition spd="med">
     <p:fade/>
   </p:transition>
-  <p:timing>
-    <p:tnLst>
-      <p:par>
-        <p:cTn id="1" dur="indefinite" restart="never" nodeType="tmRoot"/>
-      </p:par>
-    </p:tnLst>
-  </p:timing>
 </p:sld>
 </file>
 
@@ -20926,27 +20334,6 @@
 </file>
 
 <file path=customXml/item1.xml><?xml version="1.0" encoding="utf-8"?>
-<?mso-contentType ?>
-<FormTemplates xmlns="http://schemas.microsoft.com/sharepoint/v3/contenttype/forms">
-  <Display>DocumentLibraryForm</Display>
-  <Edit>DocumentLibraryForm</Edit>
-  <New>DocumentLibraryForm</New>
-</FormTemplates>
-</file>
-
-<file path=customXml/item2.xml><?xml version="1.0" encoding="utf-8"?>
-<p:properties xmlns:p="http://schemas.microsoft.com/office/2006/metadata/properties" xmlns:xsi="http://www.w3.org/2001/XMLSchema-instance" xmlns:pc="http://schemas.microsoft.com/office/infopath/2007/PartnerControls">
-  <documentManagement>
-    <_dlc_DocId xmlns="7bb5d761-a2ea-4873-95f7-7a6658fb3ef0">M4CWTKMW727E-592-73</_dlc_DocId>
-    <_dlc_DocIdUrl xmlns="7bb5d761-a2ea-4873-95f7-7a6658fb3ef0">
-      <Url>https://kms.vci.local/marketing/team/_layouts/DocIdRedir.aspx?ID=M4CWTKMW727E-592-73</Url>
-      <Description>M4CWTKMW727E-592-73</Description>
-    </_dlc_DocIdUrl>
-  </documentManagement>
-</p:properties>
-</file>
-
-<file path=customXml/item3.xml><?xml version="1.0" encoding="utf-8"?>
 <ct:contentTypeSchema xmlns:ct="http://schemas.microsoft.com/office/2006/metadata/contentType" xmlns:ma="http://schemas.microsoft.com/office/2006/metadata/properties/metaAttributes" ct:_="" ma:_="" ma:contentTypeName="Document" ma:contentTypeID="0x0101000812F700BE7F874999720E88173FE491" ma:contentTypeVersion="0" ma:contentTypeDescription="Create a new document." ma:contentTypeScope="" ma:versionID="3f79f408e2ca720b7aba6e0e32464d0c">
   <xsd:schema xmlns:xsd="http://www.w3.org/2001/XMLSchema" xmlns:xs="http://www.w3.org/2001/XMLSchema" xmlns:p="http://schemas.microsoft.com/office/2006/metadata/properties" xmlns:ns2="7bb5d761-a2ea-4873-95f7-7a6658fb3ef0" targetNamespace="http://schemas.microsoft.com/office/2006/metadata/properties" ma:root="true" ma:fieldsID="1e062cd38ba31e406bfc4340fbc7f87a" ns2:_="">
     <xsd:import namespace="7bb5d761-a2ea-4873-95f7-7a6658fb3ef0"/>
@@ -21091,6 +20478,27 @@
 </ct:contentTypeSchema>
 </file>
 
+<file path=customXml/item2.xml><?xml version="1.0" encoding="utf-8"?>
+<p:properties xmlns:p="http://schemas.microsoft.com/office/2006/metadata/properties" xmlns:xsi="http://www.w3.org/2001/XMLSchema-instance" xmlns:pc="http://schemas.microsoft.com/office/infopath/2007/PartnerControls">
+  <documentManagement>
+    <_dlc_DocId xmlns="7bb5d761-a2ea-4873-95f7-7a6658fb3ef0">M4CWTKMW727E-592-73</_dlc_DocId>
+    <_dlc_DocIdUrl xmlns="7bb5d761-a2ea-4873-95f7-7a6658fb3ef0">
+      <Url>https://kms.vci.local/marketing/team/_layouts/DocIdRedir.aspx?ID=M4CWTKMW727E-592-73</Url>
+      <Description>M4CWTKMW727E-592-73</Description>
+    </_dlc_DocIdUrl>
+  </documentManagement>
+</p:properties>
+</file>
+
+<file path=customXml/item3.xml><?xml version="1.0" encoding="utf-8"?>
+<?mso-contentType ?>
+<FormTemplates xmlns="http://schemas.microsoft.com/sharepoint/v3/contenttype/forms">
+  <Display>DocumentLibraryForm</Display>
+  <Edit>DocumentLibraryForm</Edit>
+  <New>DocumentLibraryForm</New>
+</FormTemplates>
+</file>
+
 <file path=customXml/item4.xml><?xml version="1.0" encoding="utf-8"?>
 <?mso-contentType ?>
 <spe:Receivers xmlns:spe="http://schemas.microsoft.com/sharepoint/events">
@@ -21138,30 +20546,6 @@
 </file>
 
 <file path=customXml/itemProps1.xml><?xml version="1.0" encoding="utf-8"?>
-<ds:datastoreItem xmlns:ds="http://schemas.openxmlformats.org/officeDocument/2006/customXml" ds:itemID="{5CDEB364-43EC-4510-9881-539C2A3FCE9E}">
-  <ds:schemaRefs>
-    <ds:schemaRef ds:uri="http://schemas.microsoft.com/sharepoint/v3/contenttype/forms"/>
-  </ds:schemaRefs>
-</ds:datastoreItem>
-</file>
-
-<file path=customXml/itemProps2.xml><?xml version="1.0" encoding="utf-8"?>
-<ds:datastoreItem xmlns:ds="http://schemas.openxmlformats.org/officeDocument/2006/customXml" ds:itemID="{6921749B-AEB7-461B-845F-603CABD25259}">
-  <ds:schemaRefs>
-    <ds:schemaRef ds:uri="7bb5d761-a2ea-4873-95f7-7a6658fb3ef0"/>
-    <ds:schemaRef ds:uri="http://purl.org/dc/terms/"/>
-    <ds:schemaRef ds:uri="http://schemas.openxmlformats.org/package/2006/metadata/core-properties"/>
-    <ds:schemaRef ds:uri="http://purl.org/dc/dcmitype/"/>
-    <ds:schemaRef ds:uri="http://schemas.microsoft.com/office/2006/documentManagement/types"/>
-    <ds:schemaRef ds:uri="http://purl.org/dc/elements/1.1/"/>
-    <ds:schemaRef ds:uri="http://schemas.microsoft.com/office/2006/metadata/properties"/>
-    <ds:schemaRef ds:uri="http://schemas.microsoft.com/office/infopath/2007/PartnerControls"/>
-    <ds:schemaRef ds:uri="http://www.w3.org/XML/1998/namespace"/>
-  </ds:schemaRefs>
-</ds:datastoreItem>
-</file>
-
-<file path=customXml/itemProps3.xml><?xml version="1.0" encoding="utf-8"?>
 <ds:datastoreItem xmlns:ds="http://schemas.openxmlformats.org/officeDocument/2006/customXml" ds:itemID="{164479E5-0B02-49AC-B79E-EC1D6164DDD3}">
   <ds:schemaRefs>
     <ds:schemaRef ds:uri="http://schemas.microsoft.com/office/2006/metadata/contentType"/>
@@ -21179,6 +20563,30 @@
 </ds:datastoreItem>
 </file>
 
+<file path=customXml/itemProps2.xml><?xml version="1.0" encoding="utf-8"?>
+<ds:datastoreItem xmlns:ds="http://schemas.openxmlformats.org/officeDocument/2006/customXml" ds:itemID="{6921749B-AEB7-461B-845F-603CABD25259}">
+  <ds:schemaRefs>
+    <ds:schemaRef ds:uri="7bb5d761-a2ea-4873-95f7-7a6658fb3ef0"/>
+    <ds:schemaRef ds:uri="http://purl.org/dc/dcmitype/"/>
+    <ds:schemaRef ds:uri="http://purl.org/dc/elements/1.1/"/>
+    <ds:schemaRef ds:uri="http://schemas.microsoft.com/office/infopath/2007/PartnerControls"/>
+    <ds:schemaRef ds:uri="http://schemas.microsoft.com/office/2006/metadata/properties"/>
+    <ds:schemaRef ds:uri="http://schemas.microsoft.com/office/2006/documentManagement/types"/>
+    <ds:schemaRef ds:uri="http://schemas.openxmlformats.org/package/2006/metadata/core-properties"/>
+    <ds:schemaRef ds:uri="http://www.w3.org/XML/1998/namespace"/>
+    <ds:schemaRef ds:uri="http://purl.org/dc/terms/"/>
+  </ds:schemaRefs>
+</ds:datastoreItem>
+</file>
+
+<file path=customXml/itemProps3.xml><?xml version="1.0" encoding="utf-8"?>
+<ds:datastoreItem xmlns:ds="http://schemas.openxmlformats.org/officeDocument/2006/customXml" ds:itemID="{5CDEB364-43EC-4510-9881-539C2A3FCE9E}">
+  <ds:schemaRefs>
+    <ds:schemaRef ds:uri="http://schemas.microsoft.com/sharepoint/v3/contenttype/forms"/>
+  </ds:schemaRefs>
+</ds:datastoreItem>
+</file>
+
 <file path=customXml/itemProps4.xml><?xml version="1.0" encoding="utf-8"?>
 <ds:datastoreItem xmlns:ds="http://schemas.openxmlformats.org/officeDocument/2006/customXml" ds:itemID="{B13EBC30-FE27-4C6A-B723-23FC2188F7DC}">
   <ds:schemaRefs>

</xml_diff>